<commit_message>
Finishing cron and software repos.
</commit_message>
<xml_diff>
--- a/9.SoftwareManagementAndCron/09-SoftwareManagementAndCron.pptx
+++ b/9.SoftwareManagementAndCron/09-SoftwareManagementAndCron.pptx
@@ -5,7 +5,7 @@
     <p:sldMasterId id="2147483648" r:id="rId1"/>
   </p:sldMasterIdLst>
   <p:notesMasterIdLst>
-    <p:notesMasterId r:id="rId8"/>
+    <p:notesMasterId r:id="rId13"/>
   </p:notesMasterIdLst>
   <p:sldIdLst>
     <p:sldId id="256" r:id="rId2"/>
@@ -14,6 +14,11 @@
     <p:sldId id="274" r:id="rId5"/>
     <p:sldId id="277" r:id="rId6"/>
     <p:sldId id="278" r:id="rId7"/>
+    <p:sldId id="280" r:id="rId8"/>
+    <p:sldId id="281" r:id="rId9"/>
+    <p:sldId id="282" r:id="rId10"/>
+    <p:sldId id="283" r:id="rId11"/>
+    <p:sldId id="284" r:id="rId12"/>
   </p:sldIdLst>
   <p:sldSz cx="9144000" cy="6858000" type="screen4x3"/>
   <p:notesSz cx="6858000" cy="9144000"/>
@@ -225,7 +230,7 @@
           <a:p>
             <a:fld id="{75861919-8521-4274-BB91-998CD62CEE44}" type="datetimeFigureOut">
               <a:rPr lang="en-US" smtClean="0"/>
-              <a:t>12/15/2016</a:t>
+              <a:t>12/16/2016</a:t>
             </a:fld>
             <a:endParaRPr lang="en-US"/>
           </a:p>
@@ -758,7 +763,7 @@
           <a:p>
             <a:fld id="{3EA744D9-3FBE-48D8-BF2A-85DF203E4D20}" type="datetimeFigureOut">
               <a:rPr lang="bg-BG" smtClean="0"/>
-              <a:t>15.12.2016 г.</a:t>
+              <a:t>16.12.2016 г.</a:t>
             </a:fld>
             <a:endParaRPr lang="bg-BG"/>
           </a:p>
@@ -928,7 +933,7 @@
           <a:p>
             <a:fld id="{3EA744D9-3FBE-48D8-BF2A-85DF203E4D20}" type="datetimeFigureOut">
               <a:rPr lang="bg-BG" smtClean="0"/>
-              <a:t>15.12.2016 г.</a:t>
+              <a:t>16.12.2016 г.</a:t>
             </a:fld>
             <a:endParaRPr lang="bg-BG"/>
           </a:p>
@@ -1108,7 +1113,7 @@
           <a:p>
             <a:fld id="{3EA744D9-3FBE-48D8-BF2A-85DF203E4D20}" type="datetimeFigureOut">
               <a:rPr lang="bg-BG" smtClean="0"/>
-              <a:t>15.12.2016 г.</a:t>
+              <a:t>16.12.2016 г.</a:t>
             </a:fld>
             <a:endParaRPr lang="bg-BG"/>
           </a:p>
@@ -1278,7 +1283,7 @@
           <a:p>
             <a:fld id="{3EA744D9-3FBE-48D8-BF2A-85DF203E4D20}" type="datetimeFigureOut">
               <a:rPr lang="bg-BG" smtClean="0"/>
-              <a:t>15.12.2016 г.</a:t>
+              <a:t>16.12.2016 г.</a:t>
             </a:fld>
             <a:endParaRPr lang="bg-BG"/>
           </a:p>
@@ -1524,7 +1529,7 @@
           <a:p>
             <a:fld id="{3EA744D9-3FBE-48D8-BF2A-85DF203E4D20}" type="datetimeFigureOut">
               <a:rPr lang="bg-BG" smtClean="0"/>
-              <a:t>15.12.2016 г.</a:t>
+              <a:t>16.12.2016 г.</a:t>
             </a:fld>
             <a:endParaRPr lang="bg-BG"/>
           </a:p>
@@ -1812,7 +1817,7 @@
           <a:p>
             <a:fld id="{3EA744D9-3FBE-48D8-BF2A-85DF203E4D20}" type="datetimeFigureOut">
               <a:rPr lang="bg-BG" smtClean="0"/>
-              <a:t>15.12.2016 г.</a:t>
+              <a:t>16.12.2016 г.</a:t>
             </a:fld>
             <a:endParaRPr lang="bg-BG"/>
           </a:p>
@@ -2234,7 +2239,7 @@
           <a:p>
             <a:fld id="{3EA744D9-3FBE-48D8-BF2A-85DF203E4D20}" type="datetimeFigureOut">
               <a:rPr lang="bg-BG" smtClean="0"/>
-              <a:t>15.12.2016 г.</a:t>
+              <a:t>16.12.2016 г.</a:t>
             </a:fld>
             <a:endParaRPr lang="bg-BG"/>
           </a:p>
@@ -2352,7 +2357,7 @@
           <a:p>
             <a:fld id="{3EA744D9-3FBE-48D8-BF2A-85DF203E4D20}" type="datetimeFigureOut">
               <a:rPr lang="bg-BG" smtClean="0"/>
-              <a:t>15.12.2016 г.</a:t>
+              <a:t>16.12.2016 г.</a:t>
             </a:fld>
             <a:endParaRPr lang="bg-BG"/>
           </a:p>
@@ -2447,7 +2452,7 @@
           <a:p>
             <a:fld id="{3EA744D9-3FBE-48D8-BF2A-85DF203E4D20}" type="datetimeFigureOut">
               <a:rPr lang="bg-BG" smtClean="0"/>
-              <a:t>15.12.2016 г.</a:t>
+              <a:t>16.12.2016 г.</a:t>
             </a:fld>
             <a:endParaRPr lang="bg-BG"/>
           </a:p>
@@ -2724,7 +2729,7 @@
           <a:p>
             <a:fld id="{3EA744D9-3FBE-48D8-BF2A-85DF203E4D20}" type="datetimeFigureOut">
               <a:rPr lang="bg-BG" smtClean="0"/>
-              <a:t>15.12.2016 г.</a:t>
+              <a:t>16.12.2016 г.</a:t>
             </a:fld>
             <a:endParaRPr lang="bg-BG"/>
           </a:p>
@@ -2977,7 +2982,7 @@
           <a:p>
             <a:fld id="{3EA744D9-3FBE-48D8-BF2A-85DF203E4D20}" type="datetimeFigureOut">
               <a:rPr lang="bg-BG" smtClean="0"/>
-              <a:t>15.12.2016 г.</a:t>
+              <a:t>16.12.2016 г.</a:t>
             </a:fld>
             <a:endParaRPr lang="bg-BG"/>
           </a:p>
@@ -3199,7 +3204,7 @@
           <a:p>
             <a:fld id="{3EA744D9-3FBE-48D8-BF2A-85DF203E4D20}" type="datetimeFigureOut">
               <a:rPr lang="bg-BG" smtClean="0"/>
-              <a:t>15.12.2016 г.</a:t>
+              <a:t>16.12.2016 г.</a:t>
             </a:fld>
             <a:endParaRPr lang="bg-BG"/>
           </a:p>
@@ -3918,14 +3923,30 @@
                   <a:schemeClr val="accent6"/>
                 </a:solidFill>
               </a:rPr>
-              <a:t>The default utility used to manage software packages on Red Hat Enterprise Linux distribution is ‘yum’.  Yum is designed to work with repositories, which are online depots of available software packages.</a:t>
-            </a:r>
-            <a:br>
+              <a:t>The default utility used to manage software packages on Red Hat Enterprise Linux </a:t>
+            </a:r>
+            <a:r>
               <a:rPr lang="en-US" sz="3100" dirty="0" smtClean="0">
                 <a:solidFill>
                   <a:schemeClr val="accent6"/>
                 </a:solidFill>
               </a:rPr>
+              <a:t>distributions </a:t>
+            </a:r>
+            <a:r>
+              <a:rPr lang="en-US" sz="3100" dirty="0" smtClean="0">
+                <a:solidFill>
+                  <a:schemeClr val="accent6"/>
+                </a:solidFill>
+              </a:rPr>
+              <a:t>is ‘yum’.  Yum is designed to work with repositories, which are online depots of available software packages.</a:t>
+            </a:r>
+            <a:br>
+              <a:rPr lang="en-US" sz="3100" dirty="0" smtClean="0">
+                <a:solidFill>
+                  <a:schemeClr val="accent6"/>
+                </a:solidFill>
+              </a:rPr>
             </a:br>
             <a:r>
               <a:rPr lang="en-US" sz="3100" dirty="0">
@@ -3986,7 +4007,31 @@
                   <a:schemeClr val="accent6"/>
                 </a:solidFill>
               </a:rPr>
-              <a:t>Software on Red Hat Enterprise Linux is provided in the RPM format(Red Hat Package Manager). This is a specific format used to archive the package and provide package metadata as well. </a:t>
+              <a:t>Software on Red Hat Enterprise </a:t>
+            </a:r>
+            <a:r>
+              <a:rPr lang="en-US" sz="3100" dirty="0" err="1" smtClean="0">
+                <a:solidFill>
+                  <a:schemeClr val="accent6"/>
+                </a:solidFill>
+              </a:rPr>
+              <a:t>Linuxes</a:t>
+            </a:r>
+            <a:r>
+              <a:rPr lang="en-US" sz="3100" dirty="0" smtClean="0">
+                <a:solidFill>
+                  <a:schemeClr val="accent6"/>
+                </a:solidFill>
+              </a:rPr>
+              <a:t> </a:t>
+            </a:r>
+            <a:r>
+              <a:rPr lang="en-US" sz="3100" dirty="0" smtClean="0">
+                <a:solidFill>
+                  <a:schemeClr val="accent6"/>
+                </a:solidFill>
+              </a:rPr>
+              <a:t>is provided in the RPM format(Red Hat Package Manager). This is a specific format used to archive the package and provide package metadata as well. </a:t>
             </a:r>
             <a:r>
               <a:rPr lang="en-US" sz="3100" dirty="0">
@@ -4241,6 +4286,677 @@
       </p:par>
     </p:tnLst>
   </p:timing>
+</p:sld>
+</file>
+
+<file path=ppt/slides/slide10.xml><?xml version="1.0" encoding="utf-8"?>
+<p:sld xmlns:a="http://schemas.openxmlformats.org/drawingml/2006/main" xmlns:r="http://schemas.openxmlformats.org/officeDocument/2006/relationships" xmlns:p="http://schemas.openxmlformats.org/presentationml/2006/main">
+  <p:cSld>
+    <p:spTree>
+      <p:nvGrpSpPr>
+        <p:cNvPr id="1" name=""/>
+        <p:cNvGrpSpPr/>
+        <p:nvPr/>
+      </p:nvGrpSpPr>
+      <p:grpSpPr>
+        <a:xfrm>
+          <a:off x="0" y="0"/>
+          <a:ext cx="0" cy="0"/>
+          <a:chOff x="0" y="0"/>
+          <a:chExt cx="0" cy="0"/>
+        </a:xfrm>
+      </p:grpSpPr>
+      <p:sp>
+        <p:nvSpPr>
+          <p:cNvPr id="2" name="Title 1"/>
+          <p:cNvSpPr>
+            <a:spLocks noGrp="1"/>
+          </p:cNvSpPr>
+          <p:nvPr>
+            <p:ph type="ctrTitle"/>
+          </p:nvPr>
+        </p:nvSpPr>
+        <p:spPr/>
+        <p:txBody>
+          <a:bodyPr>
+            <a:normAutofit fontScale="90000"/>
+          </a:bodyPr>
+          <a:lstStyle/>
+          <a:p>
+            <a:r>
+              <a:rPr lang="en-US" sz="2200" dirty="0" smtClean="0"/>
+              <a:t/>
+            </a:r>
+            <a:br>
+              <a:rPr lang="en-US" sz="2200" dirty="0" smtClean="0"/>
+            </a:br>
+            <a:r>
+              <a:rPr lang="en-US" sz="2200" dirty="0" err="1" smtClean="0"/>
+              <a:t>E</a:t>
+            </a:r>
+            <a:r>
+              <a:rPr lang="en-US" sz="2200" dirty="0" err="1" smtClean="0">
+                <a:solidFill>
+                  <a:schemeClr val="accent6"/>
+                </a:solidFill>
+              </a:rPr>
+              <a:t>Examples</a:t>
+            </a:r>
+            <a:r>
+              <a:rPr lang="en-US" sz="2200" dirty="0" smtClean="0">
+                <a:solidFill>
+                  <a:schemeClr val="accent6"/>
+                </a:solidFill>
+              </a:rPr>
+              <a:t> for easier understanding:</a:t>
+            </a:r>
+            <a:br>
+              <a:rPr lang="en-US" sz="2200" dirty="0" smtClean="0">
+                <a:solidFill>
+                  <a:schemeClr val="accent6"/>
+                </a:solidFill>
+              </a:rPr>
+            </a:br>
+            <a:r>
+              <a:rPr lang="en-US" dirty="0" smtClean="0">
+                <a:solidFill>
+                  <a:schemeClr val="accent6"/>
+                </a:solidFill>
+              </a:rPr>
+              <a:t/>
+            </a:r>
+            <a:br>
+              <a:rPr lang="en-US" dirty="0" smtClean="0">
+                <a:solidFill>
+                  <a:schemeClr val="accent6"/>
+                </a:solidFill>
+              </a:rPr>
+            </a:br>
+            <a:r>
+              <a:rPr lang="en-US" sz="2700" dirty="0" smtClean="0">
+                <a:solidFill>
+                  <a:schemeClr val="accent6"/>
+                </a:solidFill>
+              </a:rPr>
+              <a:t>0 9 2 2 * /</a:t>
+            </a:r>
+            <a:r>
+              <a:rPr lang="en-US" sz="2700" dirty="0" err="1" smtClean="0">
+                <a:solidFill>
+                  <a:schemeClr val="accent6"/>
+                </a:solidFill>
+              </a:rPr>
+              <a:t>usr</a:t>
+            </a:r>
+            <a:r>
+              <a:rPr lang="en-US" sz="2700" dirty="0" smtClean="0">
+                <a:solidFill>
+                  <a:schemeClr val="accent6"/>
+                </a:solidFill>
+              </a:rPr>
+              <a:t>/local/bin/</a:t>
+            </a:r>
+            <a:r>
+              <a:rPr lang="en-US" sz="2700" dirty="0" err="1" smtClean="0">
+                <a:solidFill>
+                  <a:schemeClr val="accent6"/>
+                </a:solidFill>
+              </a:rPr>
+              <a:t>yearly_backup</a:t>
+            </a:r>
+            <a:r>
+              <a:rPr lang="en-US" sz="2700" dirty="0" smtClean="0">
+                <a:solidFill>
+                  <a:schemeClr val="accent6"/>
+                </a:solidFill>
+              </a:rPr>
+              <a:t> =&gt; execute yearly backup script at 9 </a:t>
+            </a:r>
+            <a:r>
+              <a:rPr lang="en-US" sz="2700" dirty="0" err="1" smtClean="0">
+                <a:solidFill>
+                  <a:schemeClr val="accent6"/>
+                </a:solidFill>
+              </a:rPr>
+              <a:t>a.m</a:t>
+            </a:r>
+            <a:r>
+              <a:rPr lang="en-US" sz="2700" dirty="0" smtClean="0">
+                <a:solidFill>
+                  <a:schemeClr val="accent6"/>
+                </a:solidFill>
+              </a:rPr>
+              <a:t> on February 2</a:t>
+            </a:r>
+            <a:r>
+              <a:rPr lang="en-US" sz="2700" baseline="30000" dirty="0" smtClean="0">
+                <a:solidFill>
+                  <a:schemeClr val="accent6"/>
+                </a:solidFill>
+              </a:rPr>
+              <a:t>nd</a:t>
+            </a:r>
+            <a:r>
+              <a:rPr lang="en-US" sz="2700" dirty="0" smtClean="0">
+                <a:solidFill>
+                  <a:schemeClr val="accent6"/>
+                </a:solidFill>
+              </a:rPr>
+              <a:t>, every year</a:t>
+            </a:r>
+            <a:br>
+              <a:rPr lang="en-US" sz="2700" dirty="0" smtClean="0">
+                <a:solidFill>
+                  <a:schemeClr val="accent6"/>
+                </a:solidFill>
+              </a:rPr>
+            </a:br>
+            <a:r>
+              <a:rPr lang="en-US" sz="2700" dirty="0">
+                <a:solidFill>
+                  <a:schemeClr val="accent6"/>
+                </a:solidFill>
+              </a:rPr>
+              <a:t/>
+            </a:r>
+            <a:br>
+              <a:rPr lang="en-US" sz="2700" dirty="0">
+                <a:solidFill>
+                  <a:schemeClr val="accent6"/>
+                </a:solidFill>
+              </a:rPr>
+            </a:br>
+            <a:r>
+              <a:rPr lang="en-US" sz="2700" dirty="0" smtClean="0">
+                <a:solidFill>
+                  <a:schemeClr val="accent6"/>
+                </a:solidFill>
+              </a:rPr>
+              <a:t>58 23 * * 1-5 /</a:t>
+            </a:r>
+            <a:r>
+              <a:rPr lang="en-US" sz="2700" dirty="0" err="1" smtClean="0">
+                <a:solidFill>
+                  <a:schemeClr val="accent6"/>
+                </a:solidFill>
+              </a:rPr>
+              <a:t>usr</a:t>
+            </a:r>
+            <a:r>
+              <a:rPr lang="en-US" sz="2700" dirty="0" smtClean="0">
+                <a:solidFill>
+                  <a:schemeClr val="accent6"/>
+                </a:solidFill>
+              </a:rPr>
+              <a:t>/local/bin/</a:t>
+            </a:r>
+            <a:r>
+              <a:rPr lang="en-US" sz="2700" dirty="0" err="1" smtClean="0">
+                <a:solidFill>
+                  <a:schemeClr val="accent6"/>
+                </a:solidFill>
+              </a:rPr>
+              <a:t>daily_report</a:t>
+            </a:r>
+            <a:r>
+              <a:rPr lang="en-US" sz="2700" dirty="0" smtClean="0">
+                <a:solidFill>
+                  <a:schemeClr val="accent6"/>
+                </a:solidFill>
+              </a:rPr>
+              <a:t> =&gt; Run the daily report script every weekday at two minutes before midnight.</a:t>
+            </a:r>
+            <a:br>
+              <a:rPr lang="en-US" sz="2700" dirty="0" smtClean="0">
+                <a:solidFill>
+                  <a:schemeClr val="accent6"/>
+                </a:solidFill>
+              </a:rPr>
+            </a:br>
+            <a:r>
+              <a:rPr lang="en-US" sz="2700" dirty="0">
+                <a:solidFill>
+                  <a:schemeClr val="accent6"/>
+                </a:solidFill>
+              </a:rPr>
+              <a:t/>
+            </a:r>
+            <a:br>
+              <a:rPr lang="en-US" sz="2700" dirty="0">
+                <a:solidFill>
+                  <a:schemeClr val="accent6"/>
+                </a:solidFill>
+              </a:rPr>
+            </a:br>
+            <a:r>
+              <a:rPr lang="en-US" sz="2700" dirty="0" smtClean="0">
+                <a:solidFill>
+                  <a:schemeClr val="accent6"/>
+                </a:solidFill>
+              </a:rPr>
+              <a:t/>
+            </a:r>
+            <a:br>
+              <a:rPr lang="en-US" sz="2700" dirty="0" smtClean="0">
+                <a:solidFill>
+                  <a:schemeClr val="accent6"/>
+                </a:solidFill>
+              </a:rPr>
+            </a:br>
+            <a:r>
+              <a:rPr lang="en-US" sz="2700" dirty="0">
+                <a:solidFill>
+                  <a:schemeClr val="accent6"/>
+                </a:solidFill>
+              </a:rPr>
+              <a:t/>
+            </a:r>
+            <a:br>
+              <a:rPr lang="en-US" sz="2700" dirty="0">
+                <a:solidFill>
+                  <a:schemeClr val="accent6"/>
+                </a:solidFill>
+              </a:rPr>
+            </a:br>
+            <a:r>
+              <a:rPr lang="en-US" sz="2700" dirty="0" smtClean="0">
+                <a:solidFill>
+                  <a:schemeClr val="accent6"/>
+                </a:solidFill>
+              </a:rPr>
+              <a:t> </a:t>
+            </a:r>
+            <a:br>
+              <a:rPr lang="en-US" sz="2700" dirty="0" smtClean="0">
+                <a:solidFill>
+                  <a:schemeClr val="accent6"/>
+                </a:solidFill>
+              </a:rPr>
+            </a:br>
+            <a:r>
+              <a:rPr lang="en-US" sz="2700" dirty="0">
+                <a:solidFill>
+                  <a:schemeClr val="accent6"/>
+                </a:solidFill>
+              </a:rPr>
+              <a:t/>
+            </a:r>
+            <a:br>
+              <a:rPr lang="en-US" sz="2700" dirty="0">
+                <a:solidFill>
+                  <a:schemeClr val="accent6"/>
+                </a:solidFill>
+              </a:rPr>
+            </a:br>
+            <a:endParaRPr lang="en-US" sz="2700" dirty="0"/>
+          </a:p>
+        </p:txBody>
+      </p:sp>
+      <p:sp>
+        <p:nvSpPr>
+          <p:cNvPr id="3" name="Subtitle 2"/>
+          <p:cNvSpPr>
+            <a:spLocks noGrp="1"/>
+          </p:cNvSpPr>
+          <p:nvPr>
+            <p:ph type="subTitle" idx="1"/>
+          </p:nvPr>
+        </p:nvSpPr>
+        <p:spPr/>
+        <p:txBody>
+          <a:bodyPr/>
+          <a:lstStyle/>
+          <a:p>
+            <a:endParaRPr lang="en-US" dirty="0"/>
+          </a:p>
+        </p:txBody>
+      </p:sp>
+    </p:spTree>
+    <p:extLst>
+      <p:ext uri="{BB962C8B-B14F-4D97-AF65-F5344CB8AC3E}">
+        <p14:creationId xmlns:p14="http://schemas.microsoft.com/office/powerpoint/2010/main" val="1379164672"/>
+      </p:ext>
+    </p:extLst>
+  </p:cSld>
+  <p:clrMapOvr>
+    <a:masterClrMapping/>
+  </p:clrMapOvr>
+</p:sld>
+</file>
+
+<file path=ppt/slides/slide11.xml><?xml version="1.0" encoding="utf-8"?>
+<p:sld xmlns:a="http://schemas.openxmlformats.org/drawingml/2006/main" xmlns:r="http://schemas.openxmlformats.org/officeDocument/2006/relationships" xmlns:p="http://schemas.openxmlformats.org/presentationml/2006/main">
+  <p:cSld>
+    <p:spTree>
+      <p:nvGrpSpPr>
+        <p:cNvPr id="1" name=""/>
+        <p:cNvGrpSpPr/>
+        <p:nvPr/>
+      </p:nvGrpSpPr>
+      <p:grpSpPr>
+        <a:xfrm>
+          <a:off x="0" y="0"/>
+          <a:ext cx="0" cy="0"/>
+          <a:chOff x="0" y="0"/>
+          <a:chExt cx="0" cy="0"/>
+        </a:xfrm>
+      </p:grpSpPr>
+      <p:sp>
+        <p:nvSpPr>
+          <p:cNvPr id="2" name="Title 1"/>
+          <p:cNvSpPr>
+            <a:spLocks noGrp="1"/>
+          </p:cNvSpPr>
+          <p:nvPr>
+            <p:ph type="title"/>
+          </p:nvPr>
+        </p:nvSpPr>
+        <p:spPr/>
+        <p:txBody>
+          <a:bodyPr>
+            <a:normAutofit fontScale="90000"/>
+          </a:bodyPr>
+          <a:lstStyle/>
+          <a:p>
+            <a:r>
+              <a:rPr lang="en-US" dirty="0" smtClean="0">
+                <a:solidFill>
+                  <a:schemeClr val="accent6"/>
+                </a:solidFill>
+              </a:rPr>
+              <a:t/>
+            </a:r>
+            <a:br>
+              <a:rPr lang="en-US" dirty="0" smtClean="0">
+                <a:solidFill>
+                  <a:schemeClr val="accent6"/>
+                </a:solidFill>
+              </a:rPr>
+            </a:br>
+            <a:r>
+              <a:rPr lang="en-US" dirty="0">
+                <a:solidFill>
+                  <a:schemeClr val="accent6"/>
+                </a:solidFill>
+              </a:rPr>
+              <a:t/>
+            </a:r>
+            <a:br>
+              <a:rPr lang="en-US" dirty="0">
+                <a:solidFill>
+                  <a:schemeClr val="accent6"/>
+                </a:solidFill>
+              </a:rPr>
+            </a:br>
+            <a:r>
+              <a:rPr lang="en-US" dirty="0" smtClean="0">
+                <a:solidFill>
+                  <a:schemeClr val="accent6"/>
+                </a:solidFill>
+              </a:rPr>
+              <a:t/>
+            </a:r>
+            <a:br>
+              <a:rPr lang="en-US" dirty="0" smtClean="0">
+                <a:solidFill>
+                  <a:schemeClr val="accent6"/>
+                </a:solidFill>
+              </a:rPr>
+            </a:br>
+            <a:r>
+              <a:rPr lang="en-US" dirty="0">
+                <a:solidFill>
+                  <a:schemeClr val="accent6"/>
+                </a:solidFill>
+              </a:rPr>
+              <a:t/>
+            </a:r>
+            <a:br>
+              <a:rPr lang="en-US" dirty="0">
+                <a:solidFill>
+                  <a:schemeClr val="accent6"/>
+                </a:solidFill>
+              </a:rPr>
+            </a:br>
+            <a:r>
+              <a:rPr lang="en-US" dirty="0" smtClean="0">
+                <a:solidFill>
+                  <a:schemeClr val="accent6"/>
+                </a:solidFill>
+              </a:rPr>
+              <a:t/>
+            </a:r>
+            <a:br>
+              <a:rPr lang="en-US" dirty="0" smtClean="0">
+                <a:solidFill>
+                  <a:schemeClr val="accent6"/>
+                </a:solidFill>
+              </a:rPr>
+            </a:br>
+            <a:r>
+              <a:rPr lang="en-US" dirty="0">
+                <a:solidFill>
+                  <a:schemeClr val="accent6"/>
+                </a:solidFill>
+              </a:rPr>
+              <a:t/>
+            </a:r>
+            <a:br>
+              <a:rPr lang="en-US" dirty="0">
+                <a:solidFill>
+                  <a:schemeClr val="accent6"/>
+                </a:solidFill>
+              </a:rPr>
+            </a:br>
+            <a:r>
+              <a:rPr lang="en-US" dirty="0" smtClean="0">
+                <a:solidFill>
+                  <a:schemeClr val="accent6"/>
+                </a:solidFill>
+              </a:rPr>
+              <a:t/>
+            </a:r>
+            <a:br>
+              <a:rPr lang="en-US" dirty="0" smtClean="0">
+                <a:solidFill>
+                  <a:schemeClr val="accent6"/>
+                </a:solidFill>
+              </a:rPr>
+            </a:br>
+            <a:r>
+              <a:rPr lang="en-US" sz="2700" dirty="0" smtClean="0">
+                <a:solidFill>
+                  <a:srgbClr val="FF0000"/>
+                </a:solidFill>
+              </a:rPr>
+              <a:t>Homework:</a:t>
+            </a:r>
+            <a:br>
+              <a:rPr lang="en-US" sz="2700" dirty="0" smtClean="0">
+                <a:solidFill>
+                  <a:srgbClr val="FF0000"/>
+                </a:solidFill>
+              </a:rPr>
+            </a:br>
+            <a:r>
+              <a:rPr lang="en-US" sz="2700" dirty="0" smtClean="0">
+                <a:solidFill>
+                  <a:schemeClr val="accent6"/>
+                </a:solidFill>
+              </a:rPr>
+              <a:t/>
+            </a:r>
+            <a:br>
+              <a:rPr lang="en-US" sz="2700" dirty="0" smtClean="0">
+                <a:solidFill>
+                  <a:schemeClr val="accent6"/>
+                </a:solidFill>
+              </a:rPr>
+            </a:br>
+            <a:r>
+              <a:rPr lang="en-US" sz="2700" dirty="0" smtClean="0">
+                <a:solidFill>
+                  <a:schemeClr val="accent6"/>
+                </a:solidFill>
+              </a:rPr>
+              <a:t>1. Write on a piece of paper the difference between yum and rpm, and provide an example.</a:t>
+            </a:r>
+            <a:br>
+              <a:rPr lang="en-US" sz="2700" dirty="0" smtClean="0">
+                <a:solidFill>
+                  <a:schemeClr val="accent6"/>
+                </a:solidFill>
+              </a:rPr>
+            </a:br>
+            <a:r>
+              <a:rPr lang="en-US" sz="2700" dirty="0" smtClean="0">
+                <a:solidFill>
+                  <a:schemeClr val="accent6"/>
+                </a:solidFill>
+              </a:rPr>
+              <a:t/>
+            </a:r>
+            <a:br>
+              <a:rPr lang="en-US" sz="2700" dirty="0" smtClean="0">
+                <a:solidFill>
+                  <a:schemeClr val="accent6"/>
+                </a:solidFill>
+              </a:rPr>
+            </a:br>
+            <a:r>
+              <a:rPr lang="en-US" sz="2700" dirty="0" smtClean="0">
+                <a:solidFill>
+                  <a:schemeClr val="accent6"/>
+                </a:solidFill>
+              </a:rPr>
+              <a:t>2. Delete the local created Fedora EPEL repo, create it again from scratch without using the ‘</a:t>
+            </a:r>
+            <a:r>
+              <a:rPr lang="en-US" sz="2700" dirty="0" err="1" smtClean="0">
+                <a:solidFill>
+                  <a:schemeClr val="accent6"/>
+                </a:solidFill>
+              </a:rPr>
+              <a:t>yum_config_manager</a:t>
+            </a:r>
+            <a:r>
+              <a:rPr lang="en-US" sz="2700" dirty="0" smtClean="0">
+                <a:solidFill>
+                  <a:schemeClr val="accent6"/>
+                </a:solidFill>
+              </a:rPr>
+              <a:t>’.</a:t>
+            </a:r>
+            <a:br>
+              <a:rPr lang="en-US" sz="2700" dirty="0" smtClean="0">
+                <a:solidFill>
+                  <a:schemeClr val="accent6"/>
+                </a:solidFill>
+              </a:rPr>
+            </a:br>
+            <a:r>
+              <a:rPr lang="en-US" sz="2700" dirty="0" smtClean="0">
+                <a:solidFill>
+                  <a:schemeClr val="accent6"/>
+                </a:solidFill>
+              </a:rPr>
+              <a:t/>
+            </a:r>
+            <a:br>
+              <a:rPr lang="en-US" sz="2700" dirty="0" smtClean="0">
+                <a:solidFill>
+                  <a:schemeClr val="accent6"/>
+                </a:solidFill>
+              </a:rPr>
+            </a:br>
+            <a:r>
+              <a:rPr lang="en-US" sz="2700" dirty="0" smtClean="0">
+                <a:solidFill>
+                  <a:schemeClr val="accent6"/>
+                </a:solidFill>
+              </a:rPr>
+              <a:t>3. Make a simple shell script, that creates a tar.gz compressed archive of your /home directory and set up a </a:t>
+            </a:r>
+            <a:r>
+              <a:rPr lang="en-US" sz="2700" dirty="0" err="1" smtClean="0">
+                <a:solidFill>
+                  <a:schemeClr val="accent6"/>
+                </a:solidFill>
+              </a:rPr>
+              <a:t>cron</a:t>
+            </a:r>
+            <a:r>
+              <a:rPr lang="en-US" sz="2700" dirty="0" smtClean="0">
+                <a:solidFill>
+                  <a:schemeClr val="accent6"/>
+                </a:solidFill>
+              </a:rPr>
+              <a:t> job to run on Thursday.</a:t>
+            </a:r>
+            <a:br>
+              <a:rPr lang="en-US" sz="2700" dirty="0" smtClean="0">
+                <a:solidFill>
+                  <a:schemeClr val="accent6"/>
+                </a:solidFill>
+              </a:rPr>
+            </a:br>
+            <a:r>
+              <a:rPr lang="en-US" sz="2700" dirty="0">
+                <a:solidFill>
+                  <a:schemeClr val="accent6"/>
+                </a:solidFill>
+              </a:rPr>
+              <a:t/>
+            </a:r>
+            <a:br>
+              <a:rPr lang="en-US" sz="2700" dirty="0">
+                <a:solidFill>
+                  <a:schemeClr val="accent6"/>
+                </a:solidFill>
+              </a:rPr>
+            </a:br>
+            <a:r>
+              <a:rPr lang="en-US" sz="2700" dirty="0" smtClean="0">
+                <a:solidFill>
+                  <a:schemeClr val="accent6"/>
+                </a:solidFill>
+              </a:rPr>
+              <a:t>4. Google ‘at’, what is the difference between at and </a:t>
+            </a:r>
+            <a:r>
+              <a:rPr lang="en-US" sz="2700" dirty="0" err="1" smtClean="0">
+                <a:solidFill>
+                  <a:schemeClr val="accent6"/>
+                </a:solidFill>
+              </a:rPr>
+              <a:t>cron</a:t>
+            </a:r>
+            <a:r>
+              <a:rPr lang="en-US" sz="2700" dirty="0" smtClean="0">
+                <a:solidFill>
+                  <a:schemeClr val="accent6"/>
+                </a:solidFill>
+              </a:rPr>
+              <a:t>.</a:t>
+            </a:r>
+            <a:endParaRPr lang="en-US" sz="2700" dirty="0">
+              <a:solidFill>
+                <a:schemeClr val="accent6"/>
+              </a:solidFill>
+            </a:endParaRPr>
+          </a:p>
+        </p:txBody>
+      </p:sp>
+    </p:spTree>
+    <p:extLst>
+      <p:ext uri="{BB962C8B-B14F-4D97-AF65-F5344CB8AC3E}">
+        <p14:creationId xmlns:p14="http://schemas.microsoft.com/office/powerpoint/2010/main" val="72178772"/>
+      </p:ext>
+    </p:extLst>
+  </p:cSld>
+  <p:clrMapOvr>
+    <a:masterClrMapping/>
+  </p:clrMapOvr>
 </p:sld>
 </file>
 
@@ -4370,28 +5086,12 @@
               <a:t>Modern processors can run in two modes: 32-bit mode, and 64-bit mode. In 32-bit mode, they can access up to 4GB memory, in 64-bit mode, they can access much more. Older processors only support 32-bit mode. </a:t>
             </a:r>
             <a:r>
-              <a:rPr lang="en-US" sz="1400" dirty="0" err="1" smtClean="0">
-                <a:solidFill>
-                  <a:schemeClr val="accent6"/>
-                </a:solidFill>
-              </a:rPr>
-              <a:t>Applicataions</a:t>
-            </a:r>
-            <a:r>
               <a:rPr lang="en-US" sz="1400" dirty="0" smtClean="0">
                 <a:solidFill>
                   <a:schemeClr val="accent6"/>
                 </a:solidFill>
               </a:rPr>
-              <a:t>(packages) can also be written or compiled for 32-bit </a:t>
-            </a:r>
-            <a:r>
-              <a:rPr lang="en-US" sz="1400" dirty="0" err="1" smtClean="0">
-                <a:solidFill>
-                  <a:schemeClr val="accent6"/>
-                </a:solidFill>
-              </a:rPr>
-              <a:t>ot</a:t>
+              <a:t>Applications(packages</a:t>
             </a:r>
             <a:r>
               <a:rPr lang="en-US" sz="1400" dirty="0" smtClean="0">
@@ -4399,7 +5099,23 @@
                   <a:schemeClr val="accent6"/>
                 </a:solidFill>
               </a:rPr>
-              <a:t> 64-bit mode.</a:t>
+              <a:t>) can also be written or compiled for 32-bit </a:t>
+            </a:r>
+            <a:r>
+              <a:rPr lang="en-US" sz="1400" dirty="0" smtClean="0">
+                <a:solidFill>
+                  <a:schemeClr val="accent6"/>
+                </a:solidFill>
+              </a:rPr>
+              <a:t>or </a:t>
+            </a:r>
+            <a:r>
+              <a:rPr lang="en-US" sz="1400" dirty="0" smtClean="0">
+                <a:solidFill>
+                  <a:schemeClr val="accent6"/>
+                </a:solidFill>
+              </a:rPr>
+              <a:t>64-bit mode.</a:t>
             </a:r>
           </a:p>
           <a:p>
@@ -4734,83 +5450,122 @@
                   <a:schemeClr val="accent6"/>
                 </a:solidFill>
               </a:rPr>
-              <a:t>A </a:t>
-            </a:r>
-            <a:r>
+              <a:t>A major benefit of working with yum is the way that package dependencies are dealt with. This means that to install one package, other packages have to be present as well. Without using repositories, that would mean that these packages have to be installed manually.</a:t>
+            </a:r>
+            <a:br>
               <a:rPr lang="en-US" sz="2200" dirty="0" smtClean="0">
                 <a:solidFill>
                   <a:schemeClr val="accent6"/>
                 </a:solidFill>
               </a:rPr>
-              <a:t>major benefit of working with yum is the way that package dependencies are dealt with. This means that to install one package, other packages have to be present as well. Without using repositories, that would mean that these packages have to be installed manually.</a:t>
-            </a:r>
-            <a:br>
+            </a:br>
+            <a:r>
+              <a:rPr lang="en-US" sz="2200" dirty="0">
+                <a:solidFill>
+                  <a:schemeClr val="accent6"/>
+                </a:solidFill>
+              </a:rPr>
+              <a:t/>
+            </a:r>
+            <a:br>
+              <a:rPr lang="en-US" sz="2200" dirty="0">
+                <a:solidFill>
+                  <a:schemeClr val="accent6"/>
+                </a:solidFill>
+              </a:rPr>
+            </a:br>
+            <a:r>
               <a:rPr lang="en-US" sz="2200" dirty="0" smtClean="0">
                 <a:solidFill>
                   <a:schemeClr val="accent6"/>
                 </a:solidFill>
               </a:rPr>
-            </a:br>
+              <a:t>The yum takes care of resolving these dependencies automatically! In Red Hat Enterprise Linux repositories are provided through Red Hat Network. After registering with RHN, you can install software packages that are verified by Red Hat automatically. </a:t>
+            </a:r>
+            <a:r>
+              <a:rPr lang="en-US" sz="2200" dirty="0" smtClean="0">
+                <a:solidFill>
+                  <a:schemeClr val="accent6"/>
+                </a:solidFill>
+              </a:rPr>
+              <a:t>If </a:t>
+            </a:r>
+            <a:r>
+              <a:rPr lang="en-US" sz="2200" dirty="0" smtClean="0">
+                <a:solidFill>
+                  <a:schemeClr val="accent6"/>
+                </a:solidFill>
+              </a:rPr>
+              <a:t>you choose to install Red Hat Enterprise Linux without a registration key, it cannot get in touch with the RHN repositories, and you end up with no repositories at all</a:t>
+            </a:r>
             <a:r>
               <a:rPr lang="en-US" sz="2200" dirty="0">
                 <a:solidFill>
                   <a:schemeClr val="accent6"/>
                 </a:solidFill>
               </a:rPr>
-              <a:t/>
-            </a:r>
-            <a:br>
+              <a:t>. If you are using CentOS, you get access to the CentOS repositories. </a:t>
+            </a:r>
+            <a:r>
+              <a:rPr lang="en-US" sz="2200" dirty="0" smtClean="0">
+                <a:solidFill>
+                  <a:schemeClr val="accent6"/>
+                </a:solidFill>
+              </a:rPr>
+              <a:t/>
+            </a:r>
+            <a:br>
+              <a:rPr lang="en-US" sz="2200" dirty="0" smtClean="0">
+                <a:solidFill>
+                  <a:schemeClr val="accent6"/>
+                </a:solidFill>
+              </a:rPr>
+            </a:br>
+            <a:r>
               <a:rPr lang="en-US" sz="2200" dirty="0">
                 <a:solidFill>
                   <a:schemeClr val="accent6"/>
                 </a:solidFill>
               </a:rPr>
+              <a:t/>
+            </a:r>
+            <a:br>
+              <a:rPr lang="en-US" sz="2200" dirty="0">
+                <a:solidFill>
+                  <a:schemeClr val="accent6"/>
+                </a:solidFill>
+              </a:rPr>
             </a:br>
             <a:r>
               <a:rPr lang="en-US" sz="2200" dirty="0" smtClean="0">
                 <a:solidFill>
-                  <a:schemeClr val="accent6"/>
-                </a:solidFill>
-              </a:rPr>
-              <a:t>The yum takes care of resolving these dependencies automatically! In Red Hat Enterprise Linux repositories are provided through Red Hat Network. After registering with RHN, you can install software packages that are verified by Red Hat automatically. If you are using CentOS, you get access to the CentOS repositories. If you choose to install Red Hat Enterprise Linux without a registration key, it cannot get in touch with the RHN repositories, and you end up with no repositories at all.</a:t>
-            </a:r>
-            <a:br>
+                  <a:srgbClr val="FF0000"/>
+                </a:solidFill>
+              </a:rPr>
+              <a:t>Exercises:</a:t>
+            </a:r>
+            <a:r>
               <a:rPr lang="en-US" sz="2200" dirty="0" smtClean="0">
                 <a:solidFill>
                   <a:schemeClr val="accent6"/>
                 </a:solidFill>
               </a:rPr>
-            </a:br>
-            <a:r>
-              <a:rPr lang="en-US" sz="2200" dirty="0">
-                <a:solidFill>
-                  <a:schemeClr val="accent6"/>
-                </a:solidFill>
-              </a:rPr>
-              <a:t/>
-            </a:r>
-            <a:br>
-              <a:rPr lang="en-US" sz="2200" dirty="0">
-                <a:solidFill>
-                  <a:schemeClr val="accent6"/>
-                </a:solidFill>
-              </a:rPr>
-            </a:br>
-            <a:r>
+              <a:t/>
+            </a:r>
+            <a:br>
               <a:rPr lang="en-US" sz="2200" dirty="0" smtClean="0">
                 <a:solidFill>
-                  <a:srgbClr val="FF0000"/>
-                </a:solidFill>
-              </a:rPr>
-              <a:t>Exercises:</a:t>
-            </a:r>
+                  <a:schemeClr val="accent6"/>
+                </a:solidFill>
+              </a:rPr>
+            </a:br>
             <a:r>
               <a:rPr lang="en-US" sz="2200" dirty="0" smtClean="0">
                 <a:solidFill>
                   <a:schemeClr val="accent6"/>
                 </a:solidFill>
               </a:rPr>
-              <a:t/>
+              <a:t>1. man ‘yum’</a:t>
             </a:r>
             <a:br>
               <a:rPr lang="en-US" sz="2200" dirty="0" smtClean="0">
@@ -4825,30 +5580,7 @@
                   <a:schemeClr val="accent6"/>
                 </a:solidFill>
               </a:rPr>
-              <a:t>1. man ‘yum’</a:t>
-            </a:r>
-            <a:br>
-              <a:rPr lang="en-US" sz="2200" dirty="0" smtClean="0">
-                <a:solidFill>
-                  <a:schemeClr val="accent6"/>
-                </a:solidFill>
-              </a:rPr>
-            </a:br>
-            <a:r>
-              <a:rPr lang="en-US" sz="2200" dirty="0" smtClean="0">
-                <a:solidFill>
-                  <a:schemeClr val="accent6"/>
-                </a:solidFill>
-              </a:rPr>
-              <a:t>2. man ‘rpm</a:t>
-            </a:r>
-            <a:r>
-              <a:rPr lang="en-US" sz="2200" dirty="0" smtClean="0">
-                <a:solidFill>
-                  <a:schemeClr val="accent6"/>
-                </a:solidFill>
-              </a:rPr>
-              <a:t>’</a:t>
+              <a:t>2. man ‘rpm’</a:t>
             </a:r>
             <a:br>
               <a:rPr lang="en-US" sz="2200" dirty="0" smtClean="0">
@@ -5386,15 +6118,7 @@
                   <a:schemeClr val="accent6"/>
                 </a:solidFill>
               </a:rPr>
-              <a:t>To </a:t>
-            </a:r>
-            <a:r>
-              <a:rPr lang="en-US" sz="2000" dirty="0" smtClean="0">
-                <a:solidFill>
-                  <a:schemeClr val="accent6"/>
-                </a:solidFill>
-              </a:rPr>
-              <a:t>tell your server which repository to use, you need to create a file with a name that ends in .repo. In that file you need the following content:</a:t>
+              <a:t>To tell your server which repository to use, you need to create a file with a name that ends in .repo. In that file you need the following content:</a:t>
             </a:r>
             <a:br>
               <a:rPr lang="en-US" sz="2000" dirty="0" smtClean="0">
@@ -5479,15 +6203,7 @@
                   <a:schemeClr val="accent6"/>
                 </a:solidFill>
               </a:rPr>
-              <a:t> = URL that points to the specific repository location</a:t>
-            </a:r>
-            <a:r>
-              <a:rPr lang="en-US" sz="2000" dirty="0" smtClean="0">
-                <a:solidFill>
-                  <a:schemeClr val="accent6"/>
-                </a:solidFill>
-              </a:rPr>
-              <a:t>.</a:t>
+              <a:t> = URL that points to the specific repository location.</a:t>
             </a:r>
             <a:br>
               <a:rPr lang="en-US" sz="2000" dirty="0" smtClean="0">
@@ -5747,14 +6463,6 @@
               </a:rPr>
               <a:t> to your colleague, of course you could always google it.</a:t>
             </a:r>
-            <a:r>
-              <a:rPr lang="en-US" sz="2000" dirty="0" smtClean="0">
-                <a:solidFill>
-                  <a:schemeClr val="accent6"/>
-                </a:solidFill>
-              </a:rPr>
-              <a:t/>
-            </a:r>
             <a:br>
               <a:rPr lang="en-US" sz="2000" dirty="0" smtClean="0">
                 <a:solidFill>
@@ -5845,14 +6553,6 @@
                 </a:solidFill>
               </a:rPr>
               <a:t>=file:///etc/pki/rpm-gpg/RPM-GPG-KEY-CentOS-7</a:t>
-            </a:r>
-            <a:r>
-              <a:rPr lang="en-US" sz="2000" dirty="0">
-                <a:solidFill>
-                  <a:schemeClr val="accent6"/>
-                </a:solidFill>
-              </a:rPr>
-              <a:t/>
             </a:r>
             <a:br>
               <a:rPr lang="en-US" sz="2000" dirty="0">
@@ -6248,7 +6948,22 @@
                   <a:schemeClr val="accent6"/>
                 </a:solidFill>
               </a:rPr>
-              <a:t>Using repositories involves a risk, you want to make sure that you can trust the software packages you are trying to install. This is why repositories in general use keys for package signing. GPG key makes it possible to check whether packages have been changed since the owner of the repository provided them. </a:t>
+              <a:t/>
+            </a:r>
+            <a:br>
+              <a:rPr lang="en-US" sz="2000" dirty="0" smtClean="0">
+                <a:solidFill>
+                  <a:schemeClr val="accent6"/>
+                </a:solidFill>
+              </a:rPr>
+            </a:br>
+            <a:r>
+              <a:rPr lang="en-US" sz="2000" dirty="0" smtClean="0">
+                <a:solidFill>
+                  <a:schemeClr val="accent6"/>
+                </a:solidFill>
+              </a:rPr>
+              <a:t>U</a:t>
             </a:r>
             <a:br>
               <a:rPr lang="en-US" sz="2000" dirty="0" smtClean="0">
@@ -6278,6 +6993,67 @@
                   <a:schemeClr val="accent6"/>
                 </a:solidFill>
               </a:rPr>
+              <a:t/>
+            </a:r>
+            <a:br>
+              <a:rPr lang="en-US" sz="2000" dirty="0" smtClean="0">
+                <a:solidFill>
+                  <a:schemeClr val="accent6"/>
+                </a:solidFill>
+              </a:rPr>
+            </a:br>
+            <a:r>
+              <a:rPr lang="en-US" sz="2000" dirty="0" smtClean="0">
+                <a:solidFill>
+                  <a:schemeClr val="accent6"/>
+                </a:solidFill>
+              </a:rPr>
+              <a:t>Locat</a:t>
+            </a:r>
+            <a:r>
+              <a:rPr lang="en-US" sz="2000" dirty="0" smtClean="0">
+                <a:solidFill>
+                  <a:schemeClr val="accent6"/>
+                </a:solidFill>
+              </a:rPr>
+              <a:t>ing </a:t>
+            </a:r>
+            <a:r>
+              <a:rPr lang="en-US" sz="2000" dirty="0" smtClean="0">
+                <a:solidFill>
+                  <a:schemeClr val="accent6"/>
+                </a:solidFill>
+              </a:rPr>
+              <a:t>repositories involves a risk, you want to make sure that you can trust the software packages you are trying to install. This is why repositories in general use keys for package signing. GPG key makes it possible to check whether packages have been changed since the owner of the repository provided them. </a:t>
+            </a:r>
+            <a:br>
+              <a:rPr lang="en-US" sz="2000" dirty="0" smtClean="0">
+                <a:solidFill>
+                  <a:schemeClr val="accent6"/>
+                </a:solidFill>
+              </a:rPr>
+            </a:br>
+            <a:r>
+              <a:rPr lang="en-US" sz="2000" dirty="0">
+                <a:solidFill>
+                  <a:schemeClr val="accent6"/>
+                </a:solidFill>
+              </a:rPr>
+              <a:t/>
+            </a:r>
+            <a:br>
+              <a:rPr lang="en-US" sz="2000" dirty="0">
+                <a:solidFill>
+                  <a:schemeClr val="accent6"/>
+                </a:solidFill>
+              </a:rPr>
+            </a:br>
+            <a:r>
+              <a:rPr lang="en-US" sz="2000" dirty="0" smtClean="0">
+                <a:solidFill>
+                  <a:schemeClr val="accent6"/>
+                </a:solidFill>
+              </a:rPr>
               <a:t>The GPG key used to sign the software packages is typically made available through the repository as well. The users of the repository can download that key and store it locally so that the package </a:t>
             </a:r>
             <a:br>
@@ -6525,7 +7301,92 @@
                   <a:schemeClr val="accent6"/>
                 </a:solidFill>
               </a:rPr>
-              <a:t>4. yum history</a:t>
+              <a:t>4. yum </a:t>
+            </a:r>
+            <a:r>
+              <a:rPr lang="en-US" sz="2000" dirty="0" smtClean="0">
+                <a:solidFill>
+                  <a:schemeClr val="accent6"/>
+                </a:solidFill>
+              </a:rPr>
+              <a:t>history</a:t>
+            </a:r>
+            <a:br>
+              <a:rPr lang="en-US" sz="2000" dirty="0" smtClean="0">
+                <a:solidFill>
+                  <a:schemeClr val="accent6"/>
+                </a:solidFill>
+              </a:rPr>
+            </a:br>
+            <a:r>
+              <a:rPr lang="en-US" sz="2000" dirty="0" smtClean="0">
+                <a:solidFill>
+                  <a:schemeClr val="accent6"/>
+                </a:solidFill>
+              </a:rPr>
+              <a:t>5. yum list kernel (list all installed and available kernels)</a:t>
+            </a:r>
+            <a:br>
+              <a:rPr lang="en-US" sz="2000" dirty="0" smtClean="0">
+                <a:solidFill>
+                  <a:schemeClr val="accent6"/>
+                </a:solidFill>
+              </a:rPr>
+            </a:br>
+            <a:r>
+              <a:rPr lang="en-US" sz="2000" dirty="0">
+                <a:solidFill>
+                  <a:schemeClr val="accent6"/>
+                </a:solidFill>
+              </a:rPr>
+              <a:t/>
+            </a:r>
+            <a:br>
+              <a:rPr lang="en-US" sz="2000" dirty="0">
+                <a:solidFill>
+                  <a:schemeClr val="accent6"/>
+                </a:solidFill>
+              </a:rPr>
+            </a:br>
+            <a:r>
+              <a:rPr lang="en-US" sz="2000" dirty="0" smtClean="0">
+                <a:solidFill>
+                  <a:schemeClr val="accent6"/>
+                </a:solidFill>
+              </a:rPr>
+              <a:t>To view the currently running kernel, use the </a:t>
+            </a:r>
+            <a:r>
+              <a:rPr lang="en-US" sz="2000" dirty="0" err="1" smtClean="0">
+                <a:solidFill>
+                  <a:schemeClr val="accent6"/>
+                </a:solidFill>
+              </a:rPr>
+              <a:t>uname</a:t>
+            </a:r>
+            <a:r>
+              <a:rPr lang="en-US" sz="2000" dirty="0" smtClean="0">
+                <a:solidFill>
+                  <a:schemeClr val="accent6"/>
+                </a:solidFill>
+              </a:rPr>
+              <a:t> command. </a:t>
+            </a:r>
+            <a:r>
+              <a:rPr lang="en-US" sz="2000" dirty="0" err="1" smtClean="0">
+                <a:solidFill>
+                  <a:schemeClr val="accent6"/>
+                </a:solidFill>
+              </a:rPr>
+              <a:t>uname</a:t>
+            </a:r>
+            <a:r>
+              <a:rPr lang="en-US" sz="2000" dirty="0" smtClean="0">
+                <a:solidFill>
+                  <a:schemeClr val="accent6"/>
+                </a:solidFill>
+              </a:rPr>
+              <a:t> -r</a:t>
             </a:r>
             <a:endParaRPr lang="en-US" sz="2000" dirty="0">
               <a:solidFill>
@@ -6648,7 +7509,7 @@
                   <a:schemeClr val="accent6"/>
                 </a:solidFill>
               </a:rPr>
-              <a:t>Creating your own repository.</a:t>
+              <a:t/>
             </a:r>
             <a:br>
               <a:rPr lang="en-US" sz="1800" dirty="0" smtClean="0">
@@ -6660,6 +7521,164 @@
             <a:r>
               <a:rPr lang="en-US" sz="1800" dirty="0" smtClean="0">
                 <a:solidFill>
+                  <a:schemeClr val="accent6"/>
+                </a:solidFill>
+              </a:rPr>
+              <a:t/>
+            </a:r>
+            <a:br>
+              <a:rPr lang="en-US" sz="1800" dirty="0" smtClean="0">
+                <a:solidFill>
+                  <a:schemeClr val="accent6"/>
+                </a:solidFill>
+              </a:rPr>
+            </a:br>
+            <a:r>
+              <a:rPr lang="en-US" sz="1800" dirty="0" smtClean="0">
+                <a:solidFill>
+                  <a:schemeClr val="accent6"/>
+                </a:solidFill>
+              </a:rPr>
+              <a:t/>
+            </a:r>
+            <a:br>
+              <a:rPr lang="en-US" sz="1800" dirty="0" smtClean="0">
+                <a:solidFill>
+                  <a:schemeClr val="accent6"/>
+                </a:solidFill>
+              </a:rPr>
+            </a:br>
+            <a:r>
+              <a:rPr lang="en-US" sz="1800" dirty="0">
+                <a:solidFill>
+                  <a:schemeClr val="accent6"/>
+                </a:solidFill>
+              </a:rPr>
+              <a:t/>
+            </a:r>
+            <a:br>
+              <a:rPr lang="en-US" sz="1800" dirty="0">
+                <a:solidFill>
+                  <a:schemeClr val="accent6"/>
+                </a:solidFill>
+              </a:rPr>
+            </a:br>
+            <a:r>
+              <a:rPr lang="en-US" sz="1800" dirty="0" smtClean="0">
+                <a:solidFill>
+                  <a:schemeClr val="accent6"/>
+                </a:solidFill>
+              </a:rPr>
+              <a:t/>
+            </a:r>
+            <a:br>
+              <a:rPr lang="en-US" sz="1800" dirty="0" smtClean="0">
+                <a:solidFill>
+                  <a:schemeClr val="accent6"/>
+                </a:solidFill>
+              </a:rPr>
+            </a:br>
+            <a:r>
+              <a:rPr lang="en-US" sz="1800" dirty="0">
+                <a:solidFill>
+                  <a:schemeClr val="accent6"/>
+                </a:solidFill>
+              </a:rPr>
+              <a:t/>
+            </a:r>
+            <a:br>
+              <a:rPr lang="en-US" sz="1800" dirty="0">
+                <a:solidFill>
+                  <a:schemeClr val="accent6"/>
+                </a:solidFill>
+              </a:rPr>
+            </a:br>
+            <a:r>
+              <a:rPr lang="en-US" sz="1800" dirty="0" smtClean="0">
+                <a:solidFill>
+                  <a:schemeClr val="accent6"/>
+                </a:solidFill>
+              </a:rPr>
+              <a:t/>
+            </a:r>
+            <a:br>
+              <a:rPr lang="en-US" sz="1800" dirty="0" smtClean="0">
+                <a:solidFill>
+                  <a:schemeClr val="accent6"/>
+                </a:solidFill>
+              </a:rPr>
+            </a:br>
+            <a:r>
+              <a:rPr lang="en-US" sz="1800" dirty="0">
+                <a:solidFill>
+                  <a:schemeClr val="accent6"/>
+                </a:solidFill>
+              </a:rPr>
+              <a:t/>
+            </a:r>
+            <a:br>
+              <a:rPr lang="en-US" sz="1800" dirty="0">
+                <a:solidFill>
+                  <a:schemeClr val="accent6"/>
+                </a:solidFill>
+              </a:rPr>
+            </a:br>
+            <a:r>
+              <a:rPr lang="en-US" sz="1800" dirty="0" smtClean="0">
+                <a:solidFill>
+                  <a:schemeClr val="accent6"/>
+                </a:solidFill>
+              </a:rPr>
+              <a:t/>
+            </a:r>
+            <a:br>
+              <a:rPr lang="en-US" sz="1800" dirty="0" smtClean="0">
+                <a:solidFill>
+                  <a:schemeClr val="accent6"/>
+                </a:solidFill>
+              </a:rPr>
+            </a:br>
+            <a:r>
+              <a:rPr lang="en-US" sz="1800" dirty="0">
+                <a:solidFill>
+                  <a:schemeClr val="accent6"/>
+                </a:solidFill>
+              </a:rPr>
+              <a:t/>
+            </a:r>
+            <a:br>
+              <a:rPr lang="en-US" sz="1800" dirty="0">
+                <a:solidFill>
+                  <a:schemeClr val="accent6"/>
+                </a:solidFill>
+              </a:rPr>
+            </a:br>
+            <a:r>
+              <a:rPr lang="en-US" sz="1800" dirty="0" smtClean="0">
+                <a:solidFill>
+                  <a:schemeClr val="accent6"/>
+                </a:solidFill>
+              </a:rPr>
+              <a:t>Creating </a:t>
+            </a:r>
+            <a:r>
+              <a:rPr lang="en-US" sz="1800" dirty="0" smtClean="0">
+                <a:solidFill>
+                  <a:schemeClr val="accent6"/>
+                </a:solidFill>
+              </a:rPr>
+              <a:t>your own repository.</a:t>
+            </a:r>
+            <a:br>
+              <a:rPr lang="en-US" sz="1800" dirty="0" smtClean="0">
+                <a:solidFill>
+                  <a:schemeClr val="accent6"/>
+                </a:solidFill>
+              </a:rPr>
+            </a:br>
+            <a:r>
+              <a:rPr lang="en-US" sz="1800" dirty="0" smtClean="0">
+                <a:solidFill>
                   <a:srgbClr val="FF0000"/>
                 </a:solidFill>
               </a:rPr>
@@ -6702,21 +7721,69 @@
                   <a:schemeClr val="accent6"/>
                 </a:solidFill>
               </a:rPr>
-              <a:t> all</a:t>
-            </a:r>
-            <a:br>
+              <a:t> </a:t>
+            </a:r>
+            <a:r>
               <a:rPr lang="en-US" sz="1800" dirty="0" smtClean="0">
                 <a:solidFill>
                   <a:schemeClr val="accent6"/>
                 </a:solidFill>
               </a:rPr>
-            </a:br>
+              <a:t>all; grep –r enabled /</a:t>
+            </a:r>
+            <a:r>
+              <a:rPr lang="en-US" sz="1800" dirty="0" err="1" smtClean="0">
+                <a:solidFill>
+                  <a:schemeClr val="accent6"/>
+                </a:solidFill>
+              </a:rPr>
+              <a:t>etc</a:t>
+            </a:r>
             <a:r>
               <a:rPr lang="en-US" sz="1800" dirty="0" smtClean="0">
                 <a:solidFill>
                   <a:schemeClr val="accent6"/>
                 </a:solidFill>
               </a:rPr>
+              <a:t>/</a:t>
+            </a:r>
+            <a:r>
+              <a:rPr lang="en-US" sz="1800" dirty="0" err="1" smtClean="0">
+                <a:solidFill>
+                  <a:schemeClr val="accent6"/>
+                </a:solidFill>
+              </a:rPr>
+              <a:t>yum.repos.d</a:t>
+            </a:r>
+            <a:r>
+              <a:rPr lang="en-US" sz="1800" dirty="0" smtClean="0">
+                <a:solidFill>
+                  <a:schemeClr val="accent6"/>
+                </a:solidFill>
+              </a:rPr>
+              <a:t>/</a:t>
+            </a:r>
+            <a:r>
+              <a:rPr lang="en-US" sz="1800" dirty="0" smtClean="0">
+                <a:solidFill>
+                  <a:schemeClr val="accent6"/>
+                </a:solidFill>
+              </a:rPr>
+              <a:t/>
+            </a:r>
+            <a:br>
+              <a:rPr lang="en-US" sz="1800" dirty="0" smtClean="0">
+                <a:solidFill>
+                  <a:schemeClr val="accent6"/>
+                </a:solidFill>
+              </a:rPr>
+            </a:br>
+            <a:r>
+              <a:rPr lang="en-US" sz="1800" dirty="0" smtClean="0">
+                <a:solidFill>
+                  <a:schemeClr val="accent6"/>
+                </a:solidFill>
+              </a:rPr>
               <a:t>2. Enable and disable repositories with ‘yum-</a:t>
             </a:r>
             <a:r>
@@ -6748,7 +7815,86 @@
                   <a:schemeClr val="accent6"/>
                 </a:solidFill>
               </a:rPr>
-              <a:t>3. yum-</a:t>
+              <a:t>3. </a:t>
+            </a:r>
+            <a:r>
+              <a:rPr lang="en-US" sz="1800" dirty="0">
+                <a:solidFill>
+                  <a:schemeClr val="accent6"/>
+                </a:solidFill>
+              </a:rPr>
+              <a:t>yum-</a:t>
+            </a:r>
+            <a:r>
+              <a:rPr lang="en-US" sz="1800" dirty="0" err="1">
+                <a:solidFill>
+                  <a:schemeClr val="accent6"/>
+                </a:solidFill>
+              </a:rPr>
+              <a:t>config</a:t>
+            </a:r>
+            <a:r>
+              <a:rPr lang="en-US" sz="1800" dirty="0">
+                <a:solidFill>
+                  <a:schemeClr val="accent6"/>
+                </a:solidFill>
+              </a:rPr>
+              <a:t>-manager --add-repo="https://dl.fedoraproject.org/pub/</a:t>
+            </a:r>
+            <a:r>
+              <a:rPr lang="en-US" sz="1800" dirty="0" err="1">
+                <a:solidFill>
+                  <a:schemeClr val="accent6"/>
+                </a:solidFill>
+              </a:rPr>
+              <a:t>epel</a:t>
+            </a:r>
+            <a:r>
+              <a:rPr lang="en-US" sz="1800" dirty="0">
+                <a:solidFill>
+                  <a:schemeClr val="accent6"/>
+                </a:solidFill>
+              </a:rPr>
+              <a:t>/7/x86_64</a:t>
+            </a:r>
+            <a:r>
+              <a:rPr lang="en-US" sz="1800" dirty="0" smtClean="0">
+                <a:solidFill>
+                  <a:schemeClr val="accent6"/>
+                </a:solidFill>
+              </a:rPr>
+              <a:t>/"</a:t>
+            </a:r>
+            <a:r>
+              <a:rPr lang="en-US" sz="1800" dirty="0" smtClean="0">
+                <a:solidFill>
+                  <a:schemeClr val="accent6"/>
+                </a:solidFill>
+              </a:rPr>
+              <a:t/>
+            </a:r>
+            <a:br>
+              <a:rPr lang="en-US" sz="1800" dirty="0" smtClean="0">
+                <a:solidFill>
+                  <a:schemeClr val="accent6"/>
+                </a:solidFill>
+              </a:rPr>
+            </a:br>
+            <a:r>
+              <a:rPr lang="en-US" sz="1800" dirty="0" smtClean="0">
+                <a:solidFill>
+                  <a:schemeClr val="accent6"/>
+                </a:solidFill>
+              </a:rPr>
+              <a:t>4.  </a:t>
+            </a:r>
+            <a:r>
+              <a:rPr lang="en-US" sz="1800" dirty="0" smtClean="0">
+                <a:solidFill>
+                  <a:schemeClr val="accent6"/>
+                </a:solidFill>
+              </a:rPr>
+              <a:t>yum </a:t>
             </a:r>
             <a:r>
               <a:rPr lang="en-US" sz="1800" dirty="0" err="1" smtClean="0">
@@ -6756,7 +7902,7 @@
                   <a:schemeClr val="accent6"/>
                 </a:solidFill>
               </a:rPr>
-              <a:t>config</a:t>
+              <a:t>repolist</a:t>
             </a:r>
             <a:r>
               <a:rPr lang="en-US" sz="1800" dirty="0" smtClean="0">
@@ -6764,88 +7910,35 @@
                   <a:schemeClr val="accent6"/>
                 </a:solidFill>
               </a:rPr>
-              <a:t>-manager –add-repo=</a:t>
-            </a:r>
-            <a:r>
+              <a:t/>
+            </a:r>
+            <a:br>
               <a:rPr lang="en-US" sz="1800" dirty="0" smtClean="0">
                 <a:solidFill>
                   <a:schemeClr val="accent6"/>
                 </a:solidFill>
-                <a:hlinkClick r:id="rId2"/>
-              </a:rPr>
-              <a:t>http://d1.fedoraproject.org/pub/epel/beta/7/x86_64</a:t>
-            </a:r>
-            <a:r>
-              <a:rPr lang="en-US" sz="1800" dirty="0" smtClean="0">
-                <a:solidFill>
-                  <a:schemeClr val="accent6"/>
-                </a:solidFill>
-              </a:rPr>
-              <a:t/>
-            </a:r>
-            <a:br>
-              <a:rPr lang="en-US" sz="1800" dirty="0" smtClean="0">
-                <a:solidFill>
-                  <a:schemeClr val="accent6"/>
-                </a:solidFill>
-              </a:rPr>
-            </a:br>
-            <a:r>
-              <a:rPr lang="en-US" sz="1800" dirty="0" smtClean="0">
-                <a:solidFill>
-                  <a:schemeClr val="accent6"/>
-                </a:solidFill>
-              </a:rPr>
-              <a:t>4.  cd /</a:t>
-            </a:r>
-            <a:r>
-              <a:rPr lang="en-US" sz="1800" dirty="0" err="1" smtClean="0">
-                <a:solidFill>
-                  <a:schemeClr val="accent6"/>
-                </a:solidFill>
-              </a:rPr>
-              <a:t>etc</a:t>
-            </a:r>
-            <a:r>
-              <a:rPr lang="en-US" sz="1800" dirty="0" smtClean="0">
-                <a:solidFill>
-                  <a:schemeClr val="accent6"/>
-                </a:solidFill>
-              </a:rPr>
-              <a:t>/</a:t>
-            </a:r>
-            <a:r>
-              <a:rPr lang="en-US" sz="1800" dirty="0" err="1" smtClean="0">
-                <a:solidFill>
-                  <a:schemeClr val="accent6"/>
-                </a:solidFill>
-              </a:rPr>
-              <a:t>yum.repos.d</a:t>
-            </a:r>
+              </a:rPr>
+            </a:br>
+            <a:r>
+              <a:rPr lang="en-US" sz="1800" dirty="0">
+                <a:solidFill>
+                  <a:schemeClr val="accent6"/>
+                </a:solidFill>
+              </a:rPr>
+              <a:t/>
+            </a:r>
+            <a:br>
+              <a:rPr lang="en-US" sz="1800" dirty="0">
+                <a:solidFill>
+                  <a:schemeClr val="accent6"/>
+                </a:solidFill>
+              </a:rPr>
+            </a:br>
             <a:endParaRPr lang="en-US" sz="1800" dirty="0">
               <a:solidFill>
                 <a:schemeClr val="accent6"/>
               </a:solidFill>
             </a:endParaRPr>
-          </a:p>
-        </p:txBody>
-      </p:sp>
-      <p:sp>
-        <p:nvSpPr>
-          <p:cNvPr id="3" name="Content Placeholder 2"/>
-          <p:cNvSpPr>
-            <a:spLocks noGrp="1"/>
-          </p:cNvSpPr>
-          <p:nvPr>
-            <p:ph idx="1"/>
-          </p:nvPr>
-        </p:nvSpPr>
-        <p:spPr/>
-        <p:txBody>
-          <a:bodyPr/>
-          <a:lstStyle/>
-          <a:p>
-            <a:endParaRPr lang="en-US" dirty="0"/>
           </a:p>
         </p:txBody>
       </p:sp>
@@ -6853,6 +7946,1703 @@
     <p:extLst>
       <p:ext uri="{BB962C8B-B14F-4D97-AF65-F5344CB8AC3E}">
         <p14:creationId xmlns:p14="http://schemas.microsoft.com/office/powerpoint/2010/main" val="634822264"/>
+      </p:ext>
+    </p:extLst>
+  </p:cSld>
+  <p:clrMapOvr>
+    <a:masterClrMapping/>
+  </p:clrMapOvr>
+</p:sld>
+</file>
+
+<file path=ppt/slides/slide7.xml><?xml version="1.0" encoding="utf-8"?>
+<p:sld xmlns:a="http://schemas.openxmlformats.org/drawingml/2006/main" xmlns:r="http://schemas.openxmlformats.org/officeDocument/2006/relationships" xmlns:p="http://schemas.openxmlformats.org/presentationml/2006/main">
+  <p:cSld>
+    <p:spTree>
+      <p:nvGrpSpPr>
+        <p:cNvPr id="1" name=""/>
+        <p:cNvGrpSpPr/>
+        <p:nvPr/>
+      </p:nvGrpSpPr>
+      <p:grpSpPr>
+        <a:xfrm>
+          <a:off x="0" y="0"/>
+          <a:ext cx="0" cy="0"/>
+          <a:chOff x="0" y="0"/>
+          <a:chExt cx="0" cy="0"/>
+        </a:xfrm>
+      </p:grpSpPr>
+      <p:sp>
+        <p:nvSpPr>
+          <p:cNvPr id="2" name="Title 1"/>
+          <p:cNvSpPr>
+            <a:spLocks noGrp="1"/>
+          </p:cNvSpPr>
+          <p:nvPr>
+            <p:ph type="title"/>
+          </p:nvPr>
+        </p:nvSpPr>
+        <p:spPr/>
+        <p:txBody>
+          <a:bodyPr>
+            <a:normAutofit fontScale="90000"/>
+          </a:bodyPr>
+          <a:lstStyle/>
+          <a:p>
+            <a:pPr marL="457200" indent="-457200">
+              <a:buFont typeface="+mj-lt"/>
+              <a:buAutoNum type="alphaUcPeriod"/>
+            </a:pPr>
+            <a:r>
+              <a:rPr lang="en-US" sz="2000" dirty="0" smtClean="0">
+                <a:solidFill>
+                  <a:schemeClr val="accent6"/>
+                </a:solidFill>
+              </a:rPr>
+              <a:t/>
+            </a:r>
+            <a:br>
+              <a:rPr lang="en-US" sz="2000" dirty="0" smtClean="0">
+                <a:solidFill>
+                  <a:schemeClr val="accent6"/>
+                </a:solidFill>
+              </a:rPr>
+            </a:br>
+            <a:r>
+              <a:rPr lang="en-US" sz="2000" dirty="0">
+                <a:solidFill>
+                  <a:schemeClr val="accent6"/>
+                </a:solidFill>
+              </a:rPr>
+              <a:t/>
+            </a:r>
+            <a:br>
+              <a:rPr lang="en-US" sz="2000" dirty="0">
+                <a:solidFill>
+                  <a:schemeClr val="accent6"/>
+                </a:solidFill>
+              </a:rPr>
+            </a:br>
+            <a:r>
+              <a:rPr lang="en-US" sz="2000" dirty="0" smtClean="0">
+                <a:solidFill>
+                  <a:schemeClr val="accent6"/>
+                </a:solidFill>
+              </a:rPr>
+              <a:t/>
+            </a:r>
+            <a:br>
+              <a:rPr lang="en-US" sz="2000" dirty="0" smtClean="0">
+                <a:solidFill>
+                  <a:schemeClr val="accent6"/>
+                </a:solidFill>
+              </a:rPr>
+            </a:br>
+            <a:r>
+              <a:rPr lang="en-US" sz="2000" dirty="0">
+                <a:solidFill>
+                  <a:schemeClr val="accent6"/>
+                </a:solidFill>
+              </a:rPr>
+              <a:t/>
+            </a:r>
+            <a:br>
+              <a:rPr lang="en-US" sz="2000" dirty="0">
+                <a:solidFill>
+                  <a:schemeClr val="accent6"/>
+                </a:solidFill>
+              </a:rPr>
+            </a:br>
+            <a:r>
+              <a:rPr lang="en-US" sz="2000" dirty="0" smtClean="0">
+                <a:solidFill>
+                  <a:schemeClr val="accent6"/>
+                </a:solidFill>
+              </a:rPr>
+              <a:t/>
+            </a:r>
+            <a:br>
+              <a:rPr lang="en-US" sz="2000" dirty="0" smtClean="0">
+                <a:solidFill>
+                  <a:schemeClr val="accent6"/>
+                </a:solidFill>
+              </a:rPr>
+            </a:br>
+            <a:r>
+              <a:rPr lang="en-US" sz="2000" dirty="0">
+                <a:solidFill>
+                  <a:schemeClr val="accent6"/>
+                </a:solidFill>
+              </a:rPr>
+              <a:t/>
+            </a:r>
+            <a:br>
+              <a:rPr lang="en-US" sz="2000" dirty="0">
+                <a:solidFill>
+                  <a:schemeClr val="accent6"/>
+                </a:solidFill>
+              </a:rPr>
+            </a:br>
+            <a:r>
+              <a:rPr lang="en-US" sz="2000" dirty="0" smtClean="0">
+                <a:solidFill>
+                  <a:schemeClr val="accent6"/>
+                </a:solidFill>
+              </a:rPr>
+              <a:t/>
+            </a:r>
+            <a:br>
+              <a:rPr lang="en-US" sz="2000" dirty="0" smtClean="0">
+                <a:solidFill>
+                  <a:schemeClr val="accent6"/>
+                </a:solidFill>
+              </a:rPr>
+            </a:br>
+            <a:r>
+              <a:rPr lang="en-US" sz="2000" dirty="0">
+                <a:solidFill>
+                  <a:schemeClr val="accent6"/>
+                </a:solidFill>
+              </a:rPr>
+              <a:t/>
+            </a:r>
+            <a:br>
+              <a:rPr lang="en-US" sz="2000" dirty="0">
+                <a:solidFill>
+                  <a:schemeClr val="accent6"/>
+                </a:solidFill>
+              </a:rPr>
+            </a:br>
+            <a:r>
+              <a:rPr lang="en-US" sz="2000" dirty="0" smtClean="0">
+                <a:solidFill>
+                  <a:schemeClr val="accent6"/>
+                </a:solidFill>
+              </a:rPr>
+              <a:t/>
+            </a:r>
+            <a:br>
+              <a:rPr lang="en-US" sz="2000" dirty="0" smtClean="0">
+                <a:solidFill>
+                  <a:schemeClr val="accent6"/>
+                </a:solidFill>
+              </a:rPr>
+            </a:br>
+            <a:r>
+              <a:rPr lang="en-US" sz="2000" dirty="0">
+                <a:solidFill>
+                  <a:schemeClr val="accent6"/>
+                </a:solidFill>
+              </a:rPr>
+              <a:t/>
+            </a:r>
+            <a:br>
+              <a:rPr lang="en-US" sz="2000" dirty="0">
+                <a:solidFill>
+                  <a:schemeClr val="accent6"/>
+                </a:solidFill>
+              </a:rPr>
+            </a:br>
+            <a:r>
+              <a:rPr lang="en-US" sz="2000" dirty="0" smtClean="0">
+                <a:solidFill>
+                  <a:schemeClr val="accent6"/>
+                </a:solidFill>
+              </a:rPr>
+              <a:t/>
+            </a:r>
+            <a:br>
+              <a:rPr lang="en-US" sz="2000" dirty="0" smtClean="0">
+                <a:solidFill>
+                  <a:schemeClr val="accent6"/>
+                </a:solidFill>
+              </a:rPr>
+            </a:br>
+            <a:r>
+              <a:rPr lang="en-US" sz="2000" dirty="0" smtClean="0">
+                <a:solidFill>
+                  <a:schemeClr val="accent6"/>
+                </a:solidFill>
+              </a:rPr>
+              <a:t/>
+            </a:r>
+            <a:br>
+              <a:rPr lang="en-US" sz="2000" dirty="0" smtClean="0">
+                <a:solidFill>
+                  <a:schemeClr val="accent6"/>
+                </a:solidFill>
+              </a:rPr>
+            </a:br>
+            <a:r>
+              <a:rPr lang="en-US" sz="2000" dirty="0">
+                <a:solidFill>
+                  <a:schemeClr val="accent6"/>
+                </a:solidFill>
+              </a:rPr>
+              <a:t/>
+            </a:r>
+            <a:br>
+              <a:rPr lang="en-US" sz="2000" dirty="0">
+                <a:solidFill>
+                  <a:schemeClr val="accent6"/>
+                </a:solidFill>
+              </a:rPr>
+            </a:br>
+            <a:r>
+              <a:rPr lang="en-US" sz="2000" dirty="0" smtClean="0">
+                <a:solidFill>
+                  <a:schemeClr val="accent6"/>
+                </a:solidFill>
+              </a:rPr>
+              <a:t/>
+            </a:r>
+            <a:br>
+              <a:rPr lang="en-US" sz="2000" dirty="0" smtClean="0">
+                <a:solidFill>
+                  <a:schemeClr val="accent6"/>
+                </a:solidFill>
+              </a:rPr>
+            </a:br>
+            <a:r>
+              <a:rPr lang="en-US" sz="2000" dirty="0">
+                <a:solidFill>
+                  <a:schemeClr val="accent6"/>
+                </a:solidFill>
+              </a:rPr>
+              <a:t/>
+            </a:r>
+            <a:br>
+              <a:rPr lang="en-US" sz="2000" dirty="0">
+                <a:solidFill>
+                  <a:schemeClr val="accent6"/>
+                </a:solidFill>
+              </a:rPr>
+            </a:br>
+            <a:r>
+              <a:rPr lang="en-US" sz="2000" dirty="0" smtClean="0">
+                <a:solidFill>
+                  <a:schemeClr val="accent6"/>
+                </a:solidFill>
+              </a:rPr>
+              <a:t>On a Linux system, some tasks have to be automated on a regular basis. The ‘</a:t>
+            </a:r>
+            <a:r>
+              <a:rPr lang="en-US" sz="2000" dirty="0" err="1" smtClean="0">
+                <a:solidFill>
+                  <a:schemeClr val="accent6"/>
+                </a:solidFill>
+              </a:rPr>
+              <a:t>cron</a:t>
+            </a:r>
+            <a:r>
+              <a:rPr lang="en-US" sz="2000" dirty="0" smtClean="0">
+                <a:solidFill>
+                  <a:schemeClr val="accent6"/>
+                </a:solidFill>
+              </a:rPr>
+              <a:t>’ service is used as a generic service to run processes automatically at specific times. It is started by default, since some system tasks are running through </a:t>
+            </a:r>
+            <a:r>
+              <a:rPr lang="en-US" sz="2000" dirty="0" err="1" smtClean="0">
+                <a:solidFill>
+                  <a:schemeClr val="accent6"/>
+                </a:solidFill>
+              </a:rPr>
+              <a:t>cron</a:t>
+            </a:r>
+            <a:r>
+              <a:rPr lang="en-US" sz="2000" dirty="0" smtClean="0">
+                <a:solidFill>
+                  <a:schemeClr val="accent6"/>
+                </a:solidFill>
+              </a:rPr>
+              <a:t> as well (</a:t>
+            </a:r>
+            <a:r>
+              <a:rPr lang="en-US" sz="2000" dirty="0" err="1" smtClean="0">
+                <a:solidFill>
+                  <a:schemeClr val="accent6"/>
+                </a:solidFill>
+              </a:rPr>
+              <a:t>eg</a:t>
+            </a:r>
+            <a:r>
+              <a:rPr lang="en-US" sz="2000" dirty="0" smtClean="0">
+                <a:solidFill>
+                  <a:schemeClr val="accent6"/>
+                </a:solidFill>
+              </a:rPr>
+              <a:t>. </a:t>
+            </a:r>
+            <a:r>
+              <a:rPr lang="en-US" sz="2000" dirty="0" err="1" smtClean="0">
+                <a:solidFill>
+                  <a:schemeClr val="accent6"/>
+                </a:solidFill>
+              </a:rPr>
+              <a:t>Logrotate</a:t>
+            </a:r>
+            <a:r>
+              <a:rPr lang="en-US" sz="2000" dirty="0" smtClean="0">
+                <a:solidFill>
+                  <a:schemeClr val="accent6"/>
+                </a:solidFill>
+              </a:rPr>
+              <a:t>)</a:t>
+            </a:r>
+            <a:br>
+              <a:rPr lang="en-US" sz="2000" dirty="0" smtClean="0">
+                <a:solidFill>
+                  <a:schemeClr val="accent6"/>
+                </a:solidFill>
+              </a:rPr>
+            </a:br>
+            <a:r>
+              <a:rPr lang="en-US" sz="2000" dirty="0">
+                <a:solidFill>
+                  <a:schemeClr val="accent6"/>
+                </a:solidFill>
+              </a:rPr>
+              <a:t/>
+            </a:r>
+            <a:br>
+              <a:rPr lang="en-US" sz="2000" dirty="0">
+                <a:solidFill>
+                  <a:schemeClr val="accent6"/>
+                </a:solidFill>
+              </a:rPr>
+            </a:br>
+            <a:r>
+              <a:rPr lang="en-US" sz="2000" dirty="0" smtClean="0">
+                <a:solidFill>
+                  <a:srgbClr val="FF0000"/>
+                </a:solidFill>
+              </a:rPr>
+              <a:t>Exercises</a:t>
+            </a:r>
+            <a:r>
+              <a:rPr lang="en-US" sz="2000" dirty="0" smtClean="0">
+                <a:solidFill>
+                  <a:schemeClr val="accent6"/>
+                </a:solidFill>
+              </a:rPr>
+              <a:t>:</a:t>
+            </a:r>
+            <a:br>
+              <a:rPr lang="en-US" sz="2000" dirty="0" smtClean="0">
+                <a:solidFill>
+                  <a:schemeClr val="accent6"/>
+                </a:solidFill>
+              </a:rPr>
+            </a:br>
+            <a:r>
+              <a:rPr lang="en-US" sz="2000" dirty="0" smtClean="0">
+                <a:solidFill>
+                  <a:schemeClr val="accent6"/>
+                </a:solidFill>
+              </a:rPr>
+              <a:t>1. man ‘</a:t>
+            </a:r>
+            <a:r>
+              <a:rPr lang="en-US" sz="2000" dirty="0" err="1" smtClean="0">
+                <a:solidFill>
+                  <a:schemeClr val="accent6"/>
+                </a:solidFill>
+              </a:rPr>
+              <a:t>crond</a:t>
+            </a:r>
+            <a:r>
+              <a:rPr lang="en-US" sz="2000" dirty="0" smtClean="0">
+                <a:solidFill>
+                  <a:schemeClr val="accent6"/>
+                </a:solidFill>
+              </a:rPr>
+              <a:t>’</a:t>
+            </a:r>
+            <a:br>
+              <a:rPr lang="en-US" sz="2000" dirty="0" smtClean="0">
+                <a:solidFill>
+                  <a:schemeClr val="accent6"/>
+                </a:solidFill>
+              </a:rPr>
+            </a:br>
+            <a:r>
+              <a:rPr lang="en-US" sz="2000" dirty="0" smtClean="0">
+                <a:solidFill>
+                  <a:schemeClr val="accent6"/>
+                </a:solidFill>
+              </a:rPr>
+              <a:t>2. man ‘</a:t>
+            </a:r>
+            <a:r>
+              <a:rPr lang="en-US" sz="2000" dirty="0" err="1" smtClean="0">
+                <a:solidFill>
+                  <a:schemeClr val="accent6"/>
+                </a:solidFill>
+              </a:rPr>
+              <a:t>crontab</a:t>
+            </a:r>
+            <a:r>
+              <a:rPr lang="en-US" sz="2000" dirty="0" smtClean="0">
+                <a:solidFill>
+                  <a:schemeClr val="accent6"/>
+                </a:solidFill>
+              </a:rPr>
+              <a:t>’</a:t>
+            </a:r>
+            <a:br>
+              <a:rPr lang="en-US" sz="2000" dirty="0" smtClean="0">
+                <a:solidFill>
+                  <a:schemeClr val="accent6"/>
+                </a:solidFill>
+              </a:rPr>
+            </a:br>
+            <a:r>
+              <a:rPr lang="en-US" sz="2000" dirty="0" smtClean="0">
+                <a:solidFill>
+                  <a:schemeClr val="accent6"/>
+                </a:solidFill>
+              </a:rPr>
+              <a:t>3.systemctl status </a:t>
+            </a:r>
+            <a:r>
+              <a:rPr lang="en-US" sz="2000" dirty="0" err="1" smtClean="0">
+                <a:solidFill>
+                  <a:schemeClr val="accent6"/>
+                </a:solidFill>
+              </a:rPr>
+              <a:t>crond</a:t>
+            </a:r>
+            <a:r>
+              <a:rPr lang="en-US" sz="2000" dirty="0" smtClean="0">
+                <a:solidFill>
+                  <a:schemeClr val="accent6"/>
+                </a:solidFill>
+              </a:rPr>
+              <a:t> –l</a:t>
+            </a:r>
+            <a:br>
+              <a:rPr lang="en-US" sz="2000" dirty="0" smtClean="0">
+                <a:solidFill>
+                  <a:schemeClr val="accent6"/>
+                </a:solidFill>
+              </a:rPr>
+            </a:br>
+            <a:r>
+              <a:rPr lang="en-US" sz="2000" dirty="0" smtClean="0">
+                <a:solidFill>
+                  <a:schemeClr val="accent6"/>
+                </a:solidFill>
+              </a:rPr>
+              <a:t>4. ls –l /</a:t>
+            </a:r>
+            <a:r>
+              <a:rPr lang="en-US" sz="2000" dirty="0" err="1" smtClean="0">
+                <a:solidFill>
+                  <a:schemeClr val="accent6"/>
+                </a:solidFill>
+              </a:rPr>
+              <a:t>etc</a:t>
+            </a:r>
+            <a:r>
+              <a:rPr lang="en-US" sz="2000" dirty="0" smtClean="0">
+                <a:solidFill>
+                  <a:schemeClr val="accent6"/>
+                </a:solidFill>
+              </a:rPr>
+              <a:t>/</a:t>
+            </a:r>
+            <a:r>
+              <a:rPr lang="en-US" sz="2000" dirty="0" err="1" smtClean="0">
+                <a:solidFill>
+                  <a:schemeClr val="accent6"/>
+                </a:solidFill>
+              </a:rPr>
+              <a:t>cron</a:t>
+            </a:r>
+            <a:r>
+              <a:rPr lang="en-US" sz="2000" dirty="0" smtClean="0">
+                <a:solidFill>
+                  <a:schemeClr val="accent6"/>
+                </a:solidFill>
+              </a:rPr>
+              <a:t>*</a:t>
+            </a:r>
+            <a:br>
+              <a:rPr lang="en-US" sz="2000" dirty="0" smtClean="0">
+                <a:solidFill>
+                  <a:schemeClr val="accent6"/>
+                </a:solidFill>
+              </a:rPr>
+            </a:br>
+            <a:r>
+              <a:rPr lang="en-US" sz="2000" dirty="0" smtClean="0">
+                <a:solidFill>
+                  <a:schemeClr val="accent6"/>
+                </a:solidFill>
+              </a:rPr>
+              <a:t>4. cat /</a:t>
+            </a:r>
+            <a:r>
+              <a:rPr lang="en-US" sz="2000" dirty="0" err="1" smtClean="0">
+                <a:solidFill>
+                  <a:schemeClr val="accent6"/>
+                </a:solidFill>
+              </a:rPr>
+              <a:t>etc</a:t>
+            </a:r>
+            <a:r>
+              <a:rPr lang="en-US" sz="2000" dirty="0" smtClean="0">
+                <a:solidFill>
+                  <a:schemeClr val="accent6"/>
+                </a:solidFill>
+              </a:rPr>
+              <a:t>/</a:t>
+            </a:r>
+            <a:r>
+              <a:rPr lang="en-US" sz="2000" dirty="0" err="1" smtClean="0">
+                <a:solidFill>
+                  <a:schemeClr val="accent6"/>
+                </a:solidFill>
+              </a:rPr>
+              <a:t>crontab</a:t>
+            </a:r>
+            <a:r>
+              <a:rPr lang="en-US" sz="2000" dirty="0" smtClean="0">
+                <a:solidFill>
+                  <a:schemeClr val="accent6"/>
+                </a:solidFill>
+              </a:rPr>
+              <a:t/>
+            </a:r>
+            <a:br>
+              <a:rPr lang="en-US" sz="2000" dirty="0" smtClean="0">
+                <a:solidFill>
+                  <a:schemeClr val="accent6"/>
+                </a:solidFill>
+              </a:rPr>
+            </a:br>
+            <a:r>
+              <a:rPr lang="en-US" sz="2000" dirty="0" smtClean="0">
+                <a:solidFill>
+                  <a:schemeClr val="accent6"/>
+                </a:solidFill>
+              </a:rPr>
+              <a:t/>
+            </a:r>
+            <a:br>
+              <a:rPr lang="en-US" sz="2000" dirty="0" smtClean="0">
+                <a:solidFill>
+                  <a:schemeClr val="accent6"/>
+                </a:solidFill>
+              </a:rPr>
+            </a:br>
+            <a:r>
+              <a:rPr lang="en-US" sz="2000" dirty="0" err="1" smtClean="0">
+                <a:solidFill>
+                  <a:schemeClr val="accent6"/>
+                </a:solidFill>
+              </a:rPr>
+              <a:t>Cron</a:t>
+            </a:r>
+            <a:r>
+              <a:rPr lang="en-US" sz="2000" dirty="0" smtClean="0">
+                <a:solidFill>
+                  <a:schemeClr val="accent6"/>
+                </a:solidFill>
+              </a:rPr>
+              <a:t> files in </a:t>
+            </a:r>
+            <a:r>
+              <a:rPr lang="en-US" sz="2000" dirty="0" smtClean="0">
+                <a:solidFill>
+                  <a:srgbClr val="FF0000"/>
+                </a:solidFill>
+              </a:rPr>
+              <a:t>/</a:t>
+            </a:r>
+            <a:r>
+              <a:rPr lang="en-US" sz="2000" dirty="0" err="1" smtClean="0">
+                <a:solidFill>
+                  <a:srgbClr val="FF0000"/>
+                </a:solidFill>
+              </a:rPr>
+              <a:t>etc</a:t>
+            </a:r>
+            <a:r>
+              <a:rPr lang="en-US" sz="2000" dirty="0" smtClean="0">
+                <a:solidFill>
+                  <a:srgbClr val="FF0000"/>
+                </a:solidFill>
+              </a:rPr>
+              <a:t>/</a:t>
+            </a:r>
+            <a:r>
+              <a:rPr lang="en-US" sz="2000" dirty="0" err="1" smtClean="0">
+                <a:solidFill>
+                  <a:srgbClr val="FF0000"/>
+                </a:solidFill>
+              </a:rPr>
+              <a:t>cron.d</a:t>
+            </a:r>
+            <a:r>
+              <a:rPr lang="en-US" sz="2000" dirty="0" smtClean="0">
+                <a:solidFill>
+                  <a:schemeClr val="accent6"/>
+                </a:solidFill>
+              </a:rPr>
+              <a:t/>
+            </a:r>
+            <a:br>
+              <a:rPr lang="en-US" sz="2000" dirty="0" smtClean="0">
+                <a:solidFill>
+                  <a:schemeClr val="accent6"/>
+                </a:solidFill>
+              </a:rPr>
+            </a:br>
+            <a:r>
+              <a:rPr lang="en-US" sz="2000" dirty="0" smtClean="0">
+                <a:solidFill>
+                  <a:schemeClr val="accent6"/>
+                </a:solidFill>
+              </a:rPr>
+              <a:t>Scripts in </a:t>
+            </a:r>
+            <a:r>
+              <a:rPr lang="en-US" sz="2000" dirty="0" smtClean="0">
+                <a:solidFill>
+                  <a:srgbClr val="FF0000"/>
+                </a:solidFill>
+              </a:rPr>
+              <a:t>/</a:t>
+            </a:r>
+            <a:r>
+              <a:rPr lang="en-US" sz="2000" dirty="0" err="1" smtClean="0">
+                <a:solidFill>
+                  <a:srgbClr val="FF0000"/>
+                </a:solidFill>
+              </a:rPr>
+              <a:t>etc</a:t>
+            </a:r>
+            <a:r>
+              <a:rPr lang="en-US" sz="2000" dirty="0" smtClean="0">
+                <a:solidFill>
+                  <a:srgbClr val="FF0000"/>
+                </a:solidFill>
+              </a:rPr>
+              <a:t>/</a:t>
+            </a:r>
+            <a:r>
+              <a:rPr lang="en-US" sz="2000" dirty="0" err="1" smtClean="0">
+                <a:solidFill>
+                  <a:srgbClr val="FF0000"/>
+                </a:solidFill>
+              </a:rPr>
+              <a:t>cron.hourly</a:t>
+            </a:r>
+            <a:r>
+              <a:rPr lang="en-US" sz="2000" dirty="0" smtClean="0">
+                <a:solidFill>
+                  <a:schemeClr val="accent6"/>
+                </a:solidFill>
+              </a:rPr>
+              <a:t>, </a:t>
+            </a:r>
+            <a:r>
+              <a:rPr lang="en-US" sz="2000" dirty="0" err="1" smtClean="0">
+                <a:solidFill>
+                  <a:srgbClr val="FF0000"/>
+                </a:solidFill>
+              </a:rPr>
+              <a:t>cron.daily</a:t>
+            </a:r>
+            <a:r>
+              <a:rPr lang="en-US" sz="2000" dirty="0" smtClean="0">
+                <a:solidFill>
+                  <a:schemeClr val="accent6"/>
+                </a:solidFill>
+              </a:rPr>
+              <a:t>, </a:t>
+            </a:r>
+            <a:r>
+              <a:rPr lang="en-US" sz="2000" dirty="0" err="1" smtClean="0">
+                <a:solidFill>
+                  <a:srgbClr val="FF0000"/>
+                </a:solidFill>
+              </a:rPr>
+              <a:t>cron.weekly</a:t>
+            </a:r>
+            <a:r>
+              <a:rPr lang="en-US" sz="2000" dirty="0" smtClean="0">
+                <a:solidFill>
+                  <a:schemeClr val="accent6"/>
+                </a:solidFill>
+              </a:rPr>
+              <a:t> and </a:t>
+            </a:r>
+            <a:r>
+              <a:rPr lang="en-US" sz="2000" dirty="0" err="1" smtClean="0">
+                <a:solidFill>
+                  <a:srgbClr val="FF0000"/>
+                </a:solidFill>
+              </a:rPr>
+              <a:t>cron.monthly</a:t>
+            </a:r>
+            <a:r>
+              <a:rPr lang="en-US" sz="2000" dirty="0" smtClean="0">
+                <a:solidFill>
+                  <a:schemeClr val="accent6"/>
+                </a:solidFill>
+              </a:rPr>
+              <a:t/>
+            </a:r>
+            <a:br>
+              <a:rPr lang="en-US" sz="2000" dirty="0" smtClean="0">
+                <a:solidFill>
+                  <a:schemeClr val="accent6"/>
+                </a:solidFill>
+              </a:rPr>
+            </a:br>
+            <a:r>
+              <a:rPr lang="en-US" sz="2000" dirty="0" smtClean="0">
+                <a:solidFill>
+                  <a:schemeClr val="accent6"/>
+                </a:solidFill>
+              </a:rPr>
+              <a:t>User-specific files =&gt; </a:t>
+            </a:r>
+            <a:r>
+              <a:rPr lang="en-US" sz="2000" dirty="0" err="1" smtClean="0">
+                <a:solidFill>
+                  <a:srgbClr val="FF0000"/>
+                </a:solidFill>
+              </a:rPr>
+              <a:t>crontab</a:t>
+            </a:r>
+            <a:r>
+              <a:rPr lang="en-US" sz="2000" dirty="0" smtClean="0">
+                <a:solidFill>
+                  <a:srgbClr val="FF0000"/>
+                </a:solidFill>
+              </a:rPr>
+              <a:t> -e</a:t>
+            </a:r>
+            <a:r>
+              <a:rPr lang="en-US" sz="2000" dirty="0" smtClean="0">
+                <a:solidFill>
+                  <a:schemeClr val="accent6"/>
+                </a:solidFill>
+              </a:rPr>
+              <a:t/>
+            </a:r>
+            <a:br>
+              <a:rPr lang="en-US" sz="2000" dirty="0" smtClean="0">
+                <a:solidFill>
+                  <a:schemeClr val="accent6"/>
+                </a:solidFill>
+              </a:rPr>
+            </a:br>
+            <a:r>
+              <a:rPr lang="en-US" sz="2000" dirty="0" smtClean="0">
+                <a:solidFill>
+                  <a:schemeClr val="accent6"/>
+                </a:solidFill>
+              </a:rPr>
+              <a:t/>
+            </a:r>
+            <a:br>
+              <a:rPr lang="en-US" sz="2000" dirty="0" smtClean="0">
+                <a:solidFill>
+                  <a:schemeClr val="accent6"/>
+                </a:solidFill>
+              </a:rPr>
+            </a:br>
+            <a:r>
+              <a:rPr lang="en-US" sz="2000" dirty="0" smtClean="0">
+                <a:solidFill>
+                  <a:schemeClr val="accent6"/>
+                </a:solidFill>
+              </a:rPr>
+              <a:t>As good Linux admins, we do not configure the /</a:t>
+            </a:r>
+            <a:r>
+              <a:rPr lang="en-US" sz="2000" dirty="0" err="1" smtClean="0">
+                <a:solidFill>
+                  <a:schemeClr val="accent6"/>
+                </a:solidFill>
+              </a:rPr>
+              <a:t>etc</a:t>
+            </a:r>
+            <a:r>
+              <a:rPr lang="en-US" sz="2000" dirty="0" smtClean="0">
+                <a:solidFill>
+                  <a:schemeClr val="accent6"/>
+                </a:solidFill>
+              </a:rPr>
+              <a:t>/</a:t>
+            </a:r>
+            <a:r>
+              <a:rPr lang="en-US" sz="2000" dirty="0" err="1" smtClean="0">
+                <a:solidFill>
+                  <a:schemeClr val="accent6"/>
+                </a:solidFill>
+              </a:rPr>
+              <a:t>crontab</a:t>
+            </a:r>
+            <a:r>
+              <a:rPr lang="en-US" sz="2000" dirty="0" smtClean="0">
+                <a:solidFill>
+                  <a:schemeClr val="accent6"/>
+                </a:solidFill>
+              </a:rPr>
+              <a:t> file</a:t>
+            </a:r>
+            <a:endParaRPr lang="en-US" sz="2000" dirty="0">
+              <a:solidFill>
+                <a:schemeClr val="accent6"/>
+              </a:solidFill>
+            </a:endParaRPr>
+          </a:p>
+        </p:txBody>
+      </p:sp>
+    </p:spTree>
+    <p:extLst>
+      <p:ext uri="{BB962C8B-B14F-4D97-AF65-F5344CB8AC3E}">
+        <p14:creationId xmlns:p14="http://schemas.microsoft.com/office/powerpoint/2010/main" val="4181217424"/>
+      </p:ext>
+    </p:extLst>
+  </p:cSld>
+  <p:clrMapOvr>
+    <a:masterClrMapping/>
+  </p:clrMapOvr>
+</p:sld>
+</file>
+
+<file path=ppt/slides/slide8.xml><?xml version="1.0" encoding="utf-8"?>
+<p:sld xmlns:a="http://schemas.openxmlformats.org/drawingml/2006/main" xmlns:r="http://schemas.openxmlformats.org/officeDocument/2006/relationships" xmlns:p="http://schemas.openxmlformats.org/presentationml/2006/main">
+  <p:cSld>
+    <p:spTree>
+      <p:nvGrpSpPr>
+        <p:cNvPr id="1" name=""/>
+        <p:cNvGrpSpPr/>
+        <p:nvPr/>
+      </p:nvGrpSpPr>
+      <p:grpSpPr>
+        <a:xfrm>
+          <a:off x="0" y="0"/>
+          <a:ext cx="0" cy="0"/>
+          <a:chOff x="0" y="0"/>
+          <a:chExt cx="0" cy="0"/>
+        </a:xfrm>
+      </p:grpSpPr>
+      <p:sp>
+        <p:nvSpPr>
+          <p:cNvPr id="2" name="Title 1"/>
+          <p:cNvSpPr>
+            <a:spLocks noGrp="1"/>
+          </p:cNvSpPr>
+          <p:nvPr>
+            <p:ph type="ctrTitle"/>
+          </p:nvPr>
+        </p:nvSpPr>
+        <p:spPr/>
+        <p:txBody>
+          <a:bodyPr>
+            <a:normAutofit/>
+          </a:bodyPr>
+          <a:lstStyle/>
+          <a:p>
+            <a:r>
+              <a:rPr lang="en-US" sz="2400" dirty="0" err="1" smtClean="0"/>
+              <a:t>To</a:t>
+            </a:r>
+            <a:r>
+              <a:rPr lang="en-US" sz="2400" dirty="0" err="1" smtClean="0">
+                <a:solidFill>
+                  <a:schemeClr val="accent6"/>
+                </a:solidFill>
+              </a:rPr>
+              <a:t>To</a:t>
+            </a:r>
+            <a:r>
+              <a:rPr lang="en-US" sz="2400" dirty="0" smtClean="0">
+                <a:solidFill>
+                  <a:schemeClr val="accent6"/>
+                </a:solidFill>
+              </a:rPr>
+              <a:t> ensure regular execution of the job, </a:t>
+            </a:r>
+            <a:r>
+              <a:rPr lang="en-US" sz="2400" dirty="0" err="1" smtClean="0">
+                <a:solidFill>
+                  <a:schemeClr val="accent6"/>
+                </a:solidFill>
+              </a:rPr>
+              <a:t>cron</a:t>
+            </a:r>
+            <a:r>
+              <a:rPr lang="en-US" sz="2400" dirty="0" smtClean="0">
+                <a:solidFill>
+                  <a:schemeClr val="accent6"/>
+                </a:solidFill>
+              </a:rPr>
+              <a:t> uses the </a:t>
+            </a:r>
+            <a:r>
+              <a:rPr lang="en-US" sz="2400" dirty="0" err="1" smtClean="0">
+                <a:solidFill>
+                  <a:schemeClr val="accent6"/>
+                </a:solidFill>
+              </a:rPr>
+              <a:t>anacron</a:t>
+            </a:r>
+            <a:r>
+              <a:rPr lang="en-US" sz="2400" dirty="0" smtClean="0">
+                <a:solidFill>
+                  <a:schemeClr val="accent6"/>
+                </a:solidFill>
+              </a:rPr>
+              <a:t> service. This service takes care of starting the hourly, daily, weekly and monthly </a:t>
+            </a:r>
+            <a:r>
+              <a:rPr lang="en-US" sz="2400" dirty="0" err="1" smtClean="0">
+                <a:solidFill>
+                  <a:schemeClr val="accent6"/>
+                </a:solidFill>
+              </a:rPr>
+              <a:t>cron</a:t>
+            </a:r>
+            <a:r>
+              <a:rPr lang="en-US" sz="2400" dirty="0" smtClean="0">
+                <a:solidFill>
+                  <a:schemeClr val="accent6"/>
+                </a:solidFill>
+              </a:rPr>
+              <a:t> jobs.</a:t>
+            </a:r>
+            <a:endParaRPr lang="en-US" sz="2400" dirty="0"/>
+          </a:p>
+        </p:txBody>
+      </p:sp>
+      <p:sp>
+        <p:nvSpPr>
+          <p:cNvPr id="3" name="Subtitle 2"/>
+          <p:cNvSpPr>
+            <a:spLocks noGrp="1"/>
+          </p:cNvSpPr>
+          <p:nvPr>
+            <p:ph type="subTitle" idx="1"/>
+          </p:nvPr>
+        </p:nvSpPr>
+        <p:spPr/>
+        <p:txBody>
+          <a:bodyPr>
+            <a:normAutofit fontScale="85000" lnSpcReduction="20000"/>
+          </a:bodyPr>
+          <a:lstStyle/>
+          <a:p>
+            <a:endParaRPr lang="en-US" dirty="0" smtClean="0"/>
+          </a:p>
+          <a:p>
+            <a:r>
+              <a:rPr lang="en-US" dirty="0" smtClean="0">
+                <a:solidFill>
+                  <a:srgbClr val="FF0000"/>
+                </a:solidFill>
+              </a:rPr>
+              <a:t>Exercises:</a:t>
+            </a:r>
+          </a:p>
+          <a:p>
+            <a:pPr marL="514350" indent="-514350">
+              <a:buAutoNum type="arabicPeriod"/>
+            </a:pPr>
+            <a:r>
+              <a:rPr lang="en-US" dirty="0" smtClean="0">
+                <a:solidFill>
+                  <a:schemeClr val="accent6"/>
+                </a:solidFill>
+              </a:rPr>
+              <a:t>man ‘</a:t>
+            </a:r>
+            <a:r>
+              <a:rPr lang="en-US" dirty="0" err="1" smtClean="0">
+                <a:solidFill>
+                  <a:schemeClr val="accent6"/>
+                </a:solidFill>
+              </a:rPr>
+              <a:t>anacron</a:t>
+            </a:r>
+            <a:r>
+              <a:rPr lang="en-US" dirty="0" smtClean="0">
+                <a:solidFill>
+                  <a:schemeClr val="accent6"/>
+                </a:solidFill>
+              </a:rPr>
+              <a:t>’</a:t>
+            </a:r>
+          </a:p>
+          <a:p>
+            <a:pPr marL="514350" indent="-514350">
+              <a:buAutoNum type="arabicPeriod"/>
+            </a:pPr>
+            <a:r>
+              <a:rPr lang="en-US" dirty="0">
+                <a:solidFill>
+                  <a:schemeClr val="accent6"/>
+                </a:solidFill>
+              </a:rPr>
+              <a:t>c</a:t>
+            </a:r>
+            <a:r>
+              <a:rPr lang="en-US" dirty="0" smtClean="0">
+                <a:solidFill>
+                  <a:schemeClr val="accent6"/>
+                </a:solidFill>
+              </a:rPr>
+              <a:t>at /</a:t>
+            </a:r>
+            <a:r>
+              <a:rPr lang="en-US" dirty="0" err="1" smtClean="0">
+                <a:solidFill>
+                  <a:schemeClr val="accent6"/>
+                </a:solidFill>
+              </a:rPr>
+              <a:t>etc</a:t>
+            </a:r>
+            <a:r>
+              <a:rPr lang="en-US" dirty="0" smtClean="0">
+                <a:solidFill>
+                  <a:schemeClr val="accent6"/>
+                </a:solidFill>
+              </a:rPr>
+              <a:t>/</a:t>
+            </a:r>
+            <a:r>
+              <a:rPr lang="en-US" dirty="0" err="1" smtClean="0">
+                <a:solidFill>
+                  <a:schemeClr val="accent6"/>
+                </a:solidFill>
+              </a:rPr>
+              <a:t>anacrontab</a:t>
+            </a:r>
+            <a:endParaRPr lang="en-US" dirty="0">
+              <a:solidFill>
+                <a:schemeClr val="accent6"/>
+              </a:solidFill>
+            </a:endParaRPr>
+          </a:p>
+        </p:txBody>
+      </p:sp>
+    </p:spTree>
+    <p:extLst>
+      <p:ext uri="{BB962C8B-B14F-4D97-AF65-F5344CB8AC3E}">
+        <p14:creationId xmlns:p14="http://schemas.microsoft.com/office/powerpoint/2010/main" val="844906831"/>
+      </p:ext>
+    </p:extLst>
+  </p:cSld>
+  <p:clrMapOvr>
+    <a:masterClrMapping/>
+  </p:clrMapOvr>
+</p:sld>
+</file>
+
+<file path=ppt/slides/slide9.xml><?xml version="1.0" encoding="utf-8"?>
+<p:sld xmlns:a="http://schemas.openxmlformats.org/drawingml/2006/main" xmlns:r="http://schemas.openxmlformats.org/officeDocument/2006/relationships" xmlns:p="http://schemas.openxmlformats.org/presentationml/2006/main">
+  <p:cSld>
+    <p:spTree>
+      <p:nvGrpSpPr>
+        <p:cNvPr id="1" name=""/>
+        <p:cNvGrpSpPr/>
+        <p:nvPr/>
+      </p:nvGrpSpPr>
+      <p:grpSpPr>
+        <a:xfrm>
+          <a:off x="0" y="0"/>
+          <a:ext cx="0" cy="0"/>
+          <a:chOff x="0" y="0"/>
+          <a:chExt cx="0" cy="0"/>
+        </a:xfrm>
+      </p:grpSpPr>
+      <p:sp>
+        <p:nvSpPr>
+          <p:cNvPr id="2" name="Title 1"/>
+          <p:cNvSpPr>
+            <a:spLocks noGrp="1"/>
+          </p:cNvSpPr>
+          <p:nvPr>
+            <p:ph type="title"/>
+          </p:nvPr>
+        </p:nvSpPr>
+        <p:spPr/>
+        <p:txBody>
+          <a:bodyPr>
+            <a:normAutofit fontScale="90000"/>
+          </a:bodyPr>
+          <a:lstStyle/>
+          <a:p>
+            <a:r>
+              <a:rPr lang="en-US" dirty="0" smtClean="0"/>
+              <a:t/>
+            </a:r>
+            <a:br>
+              <a:rPr lang="en-US" dirty="0" smtClean="0"/>
+            </a:br>
+            <a:r>
+              <a:rPr lang="en-US" dirty="0"/>
+              <a:t/>
+            </a:r>
+            <a:br>
+              <a:rPr lang="en-US" dirty="0"/>
+            </a:br>
+            <a:r>
+              <a:rPr lang="en-US" dirty="0" smtClean="0"/>
+              <a:t/>
+            </a:r>
+            <a:br>
+              <a:rPr lang="en-US" dirty="0" smtClean="0"/>
+            </a:br>
+            <a:r>
+              <a:rPr lang="en-US" dirty="0"/>
+              <a:t/>
+            </a:r>
+            <a:br>
+              <a:rPr lang="en-US" dirty="0"/>
+            </a:br>
+            <a:r>
+              <a:rPr lang="en-US" dirty="0" smtClean="0"/>
+              <a:t/>
+            </a:r>
+            <a:br>
+              <a:rPr lang="en-US" dirty="0" smtClean="0"/>
+            </a:br>
+            <a:r>
+              <a:rPr lang="en-US" dirty="0"/>
+              <a:t/>
+            </a:r>
+            <a:br>
+              <a:rPr lang="en-US" dirty="0"/>
+            </a:br>
+            <a:r>
+              <a:rPr lang="en-US" dirty="0" smtClean="0"/>
+              <a:t/>
+            </a:r>
+            <a:br>
+              <a:rPr lang="en-US" dirty="0" smtClean="0"/>
+            </a:br>
+            <a:r>
+              <a:rPr lang="en-US" dirty="0"/>
+              <a:t/>
+            </a:r>
+            <a:br>
+              <a:rPr lang="en-US" dirty="0"/>
+            </a:br>
+            <a:r>
+              <a:rPr lang="en-US" dirty="0" smtClean="0"/>
+              <a:t>Job</a:t>
+            </a:r>
+            <a:br>
+              <a:rPr lang="en-US" dirty="0" smtClean="0"/>
+            </a:br>
+            <a:r>
+              <a:rPr lang="en-US" sz="2200" dirty="0" err="1" smtClean="0">
+                <a:solidFill>
+                  <a:schemeClr val="accent6"/>
+                </a:solidFill>
+              </a:rPr>
+              <a:t>Job</a:t>
+            </a:r>
+            <a:r>
+              <a:rPr lang="en-US" sz="2200" dirty="0" smtClean="0">
+                <a:solidFill>
+                  <a:schemeClr val="accent6"/>
+                </a:solidFill>
+              </a:rPr>
+              <a:t> </a:t>
+            </a:r>
+            <a:r>
+              <a:rPr lang="en-US" sz="2200" dirty="0" err="1" smtClean="0">
+                <a:solidFill>
+                  <a:schemeClr val="accent6"/>
+                </a:solidFill>
+              </a:rPr>
+              <a:t>format</a:t>
+            </a:r>
+            <a:r>
+              <a:rPr lang="en-US" dirty="0" err="1" smtClean="0"/>
+              <a:t>ormat</a:t>
+            </a:r>
+            <a:endParaRPr lang="en-US" dirty="0"/>
+          </a:p>
+        </p:txBody>
+      </p:sp>
+      <p:graphicFrame>
+        <p:nvGraphicFramePr>
+          <p:cNvPr id="4" name="Content Placeholder 3"/>
+          <p:cNvGraphicFramePr>
+            <a:graphicFrameLocks noGrp="1"/>
+          </p:cNvGraphicFramePr>
+          <p:nvPr>
+            <p:ph idx="1"/>
+            <p:extLst>
+              <p:ext uri="{D42A27DB-BD31-4B8C-83A1-F6EECF244321}">
+                <p14:modId xmlns:p14="http://schemas.microsoft.com/office/powerpoint/2010/main" val="3112920841"/>
+              </p:ext>
+            </p:extLst>
+          </p:nvPr>
+        </p:nvGraphicFramePr>
+        <p:xfrm>
+          <a:off x="457200" y="838199"/>
+          <a:ext cx="8229600" cy="2103120"/>
+        </p:xfrm>
+        <a:graphic>
+          <a:graphicData uri="http://schemas.openxmlformats.org/drawingml/2006/table">
+            <a:tbl>
+              <a:tblPr firstRow="1" bandRow="1">
+                <a:tableStyleId>{5C22544A-7EE6-4342-B048-85BDC9FD1C3A}</a:tableStyleId>
+              </a:tblPr>
+              <a:tblGrid>
+                <a:gridCol w="4038600"/>
+                <a:gridCol w="4191000"/>
+              </a:tblGrid>
+              <a:tr h="318052">
+                <a:tc>
+                  <a:txBody>
+                    <a:bodyPr/>
+                    <a:lstStyle/>
+                    <a:p>
+                      <a:r>
+                        <a:rPr lang="en-US" dirty="0" smtClean="0"/>
+                        <a:t>Command</a:t>
+                      </a:r>
+                      <a:endParaRPr lang="en-US" dirty="0"/>
+                    </a:p>
+                  </a:txBody>
+                  <a:tcPr/>
+                </a:tc>
+                <a:tc>
+                  <a:txBody>
+                    <a:bodyPr/>
+                    <a:lstStyle/>
+                    <a:p>
+                      <a:r>
+                        <a:rPr lang="en-US" dirty="0" smtClean="0"/>
+                        <a:t>Intended use</a:t>
+                      </a:r>
+                      <a:endParaRPr lang="en-US" dirty="0"/>
+                    </a:p>
+                  </a:txBody>
+                  <a:tcPr/>
+                </a:tc>
+              </a:tr>
+              <a:tr h="318052">
+                <a:tc>
+                  <a:txBody>
+                    <a:bodyPr/>
+                    <a:lstStyle/>
+                    <a:p>
+                      <a:r>
+                        <a:rPr lang="en-US" dirty="0" err="1" smtClean="0"/>
+                        <a:t>crontab</a:t>
+                      </a:r>
+                      <a:r>
+                        <a:rPr lang="en-US" dirty="0" smtClean="0"/>
+                        <a:t> –l</a:t>
+                      </a:r>
+                      <a:endParaRPr lang="en-US" dirty="0"/>
+                    </a:p>
+                  </a:txBody>
+                  <a:tcPr/>
+                </a:tc>
+                <a:tc>
+                  <a:txBody>
+                    <a:bodyPr/>
+                    <a:lstStyle/>
+                    <a:p>
+                      <a:r>
+                        <a:rPr lang="en-US" dirty="0" smtClean="0"/>
+                        <a:t>List the jobs for</a:t>
+                      </a:r>
+                      <a:r>
+                        <a:rPr lang="en-US" baseline="0" dirty="0" smtClean="0"/>
+                        <a:t> the current user.</a:t>
+                      </a:r>
+                      <a:endParaRPr lang="en-US" dirty="0"/>
+                    </a:p>
+                  </a:txBody>
+                  <a:tcPr/>
+                </a:tc>
+              </a:tr>
+              <a:tr h="318052">
+                <a:tc>
+                  <a:txBody>
+                    <a:bodyPr/>
+                    <a:lstStyle/>
+                    <a:p>
+                      <a:r>
+                        <a:rPr lang="en-US" dirty="0" err="1" smtClean="0"/>
+                        <a:t>crontab</a:t>
+                      </a:r>
+                      <a:r>
+                        <a:rPr lang="en-US" dirty="0" smtClean="0"/>
+                        <a:t> –r </a:t>
+                      </a:r>
+                      <a:endParaRPr lang="en-US" dirty="0"/>
+                    </a:p>
+                  </a:txBody>
+                  <a:tcPr/>
+                </a:tc>
+                <a:tc>
+                  <a:txBody>
+                    <a:bodyPr/>
+                    <a:lstStyle/>
+                    <a:p>
+                      <a:r>
+                        <a:rPr lang="en-US" dirty="0" smtClean="0"/>
+                        <a:t>Remove all jobs for the current users.</a:t>
+                      </a:r>
+                      <a:endParaRPr lang="en-US" dirty="0"/>
+                    </a:p>
+                  </a:txBody>
+                  <a:tcPr/>
+                </a:tc>
+              </a:tr>
+              <a:tr h="318052">
+                <a:tc>
+                  <a:txBody>
+                    <a:bodyPr/>
+                    <a:lstStyle/>
+                    <a:p>
+                      <a:r>
+                        <a:rPr lang="en-US" dirty="0" err="1" smtClean="0"/>
+                        <a:t>crontab</a:t>
+                      </a:r>
+                      <a:r>
+                        <a:rPr lang="en-US" dirty="0" smtClean="0"/>
+                        <a:t> –e </a:t>
+                      </a:r>
+                      <a:endParaRPr lang="en-US" dirty="0"/>
+                    </a:p>
+                  </a:txBody>
+                  <a:tcPr/>
+                </a:tc>
+                <a:tc>
+                  <a:txBody>
+                    <a:bodyPr/>
+                    <a:lstStyle/>
+                    <a:p>
+                      <a:r>
+                        <a:rPr lang="en-US" dirty="0" smtClean="0"/>
+                        <a:t>Edit jobs for the current user.</a:t>
+                      </a:r>
+                      <a:endParaRPr lang="en-US" dirty="0"/>
+                    </a:p>
+                  </a:txBody>
+                  <a:tcPr/>
+                </a:tc>
+              </a:tr>
+              <a:tr h="556592">
+                <a:tc>
+                  <a:txBody>
+                    <a:bodyPr/>
+                    <a:lstStyle/>
+                    <a:p>
+                      <a:r>
+                        <a:rPr lang="en-US" dirty="0" err="1" smtClean="0"/>
+                        <a:t>crontab</a:t>
+                      </a:r>
+                      <a:r>
+                        <a:rPr lang="en-US" dirty="0" smtClean="0"/>
+                        <a:t> &lt;filename&gt; </a:t>
+                      </a:r>
+                      <a:endParaRPr lang="en-US" dirty="0"/>
+                    </a:p>
+                  </a:txBody>
+                  <a:tcPr/>
+                </a:tc>
+                <a:tc>
+                  <a:txBody>
+                    <a:bodyPr/>
+                    <a:lstStyle/>
+                    <a:p>
+                      <a:r>
+                        <a:rPr lang="en-US" dirty="0" smtClean="0"/>
+                        <a:t>Remove</a:t>
+                      </a:r>
+                      <a:r>
+                        <a:rPr lang="en-US" baseline="0" dirty="0" smtClean="0"/>
+                        <a:t> all jobs, and replace with the jobs from &lt;filename&gt;.</a:t>
+                      </a:r>
+                      <a:endParaRPr lang="en-US" dirty="0"/>
+                    </a:p>
+                  </a:txBody>
+                  <a:tcPr/>
+                </a:tc>
+              </a:tr>
+            </a:tbl>
+          </a:graphicData>
+        </a:graphic>
+      </p:graphicFrame>
+      <p:graphicFrame>
+        <p:nvGraphicFramePr>
+          <p:cNvPr id="5" name="Table 4"/>
+          <p:cNvGraphicFramePr>
+            <a:graphicFrameLocks noGrp="1"/>
+          </p:cNvGraphicFramePr>
+          <p:nvPr>
+            <p:extLst>
+              <p:ext uri="{D42A27DB-BD31-4B8C-83A1-F6EECF244321}">
+                <p14:modId xmlns:p14="http://schemas.microsoft.com/office/powerpoint/2010/main" val="1717208700"/>
+              </p:ext>
+            </p:extLst>
+          </p:nvPr>
+        </p:nvGraphicFramePr>
+        <p:xfrm>
+          <a:off x="609600" y="3849213"/>
+          <a:ext cx="8001000" cy="3428729"/>
+        </p:xfrm>
+        <a:graphic>
+          <a:graphicData uri="http://schemas.openxmlformats.org/drawingml/2006/table">
+            <a:tbl>
+              <a:tblPr firstRow="1" bandRow="1">
+                <a:tableStyleId>{5C22544A-7EE6-4342-B048-85BDC9FD1C3A}</a:tableStyleId>
+              </a:tblPr>
+              <a:tblGrid>
+                <a:gridCol w="4062046"/>
+                <a:gridCol w="3938954"/>
+              </a:tblGrid>
+              <a:tr h="345181">
+                <a:tc>
+                  <a:txBody>
+                    <a:bodyPr/>
+                    <a:lstStyle/>
+                    <a:p>
+                      <a:r>
+                        <a:rPr lang="en-US" dirty="0" smtClean="0"/>
+                        <a:t>Symbol</a:t>
+                      </a:r>
+                      <a:endParaRPr lang="en-US" dirty="0"/>
+                    </a:p>
+                  </a:txBody>
+                  <a:tcPr/>
+                </a:tc>
+                <a:tc>
+                  <a:txBody>
+                    <a:bodyPr/>
+                    <a:lstStyle/>
+                    <a:p>
+                      <a:r>
+                        <a:rPr lang="en-US" dirty="0" smtClean="0"/>
+                        <a:t>Meaning</a:t>
+                      </a:r>
+                      <a:endParaRPr lang="en-US" dirty="0"/>
+                    </a:p>
+                  </a:txBody>
+                  <a:tcPr/>
+                </a:tc>
+              </a:tr>
+              <a:tr h="345181">
+                <a:tc>
+                  <a:txBody>
+                    <a:bodyPr/>
+                    <a:lstStyle/>
+                    <a:p>
+                      <a:r>
+                        <a:rPr lang="en-US" dirty="0" smtClean="0"/>
+                        <a:t>*</a:t>
+                      </a:r>
+                      <a:endParaRPr lang="en-US" dirty="0"/>
+                    </a:p>
+                  </a:txBody>
+                  <a:tcPr/>
+                </a:tc>
+                <a:tc>
+                  <a:txBody>
+                    <a:bodyPr/>
+                    <a:lstStyle/>
+                    <a:p>
+                      <a:r>
+                        <a:rPr lang="en-US" dirty="0" smtClean="0"/>
+                        <a:t>Don’t care/Always</a:t>
+                      </a:r>
+                      <a:endParaRPr lang="en-US" dirty="0"/>
+                    </a:p>
+                  </a:txBody>
+                  <a:tcPr/>
+                </a:tc>
+              </a:tr>
+              <a:tr h="604066">
+                <a:tc>
+                  <a:txBody>
+                    <a:bodyPr/>
+                    <a:lstStyle/>
+                    <a:p>
+                      <a:r>
+                        <a:rPr lang="en-US" dirty="0" smtClean="0"/>
+                        <a:t>x-y</a:t>
+                      </a:r>
+                      <a:endParaRPr lang="en-US" dirty="0"/>
+                    </a:p>
+                  </a:txBody>
+                  <a:tcPr/>
+                </a:tc>
+                <a:tc>
+                  <a:txBody>
+                    <a:bodyPr/>
+                    <a:lstStyle/>
+                    <a:p>
+                      <a:r>
+                        <a:rPr lang="en-US" dirty="0" smtClean="0"/>
+                        <a:t>For range, x to y inclusive(</a:t>
+                      </a:r>
+                      <a:r>
+                        <a:rPr lang="en-US" dirty="0" err="1" smtClean="0"/>
+                        <a:t>eg</a:t>
+                      </a:r>
+                      <a:r>
+                        <a:rPr lang="en-US" dirty="0" smtClean="0"/>
+                        <a:t>.</a:t>
+                      </a:r>
+                      <a:r>
+                        <a:rPr lang="en-US" baseline="0" dirty="0" smtClean="0"/>
+                        <a:t> 2-5, 10-12)</a:t>
+                      </a:r>
+                      <a:endParaRPr lang="en-US" dirty="0"/>
+                    </a:p>
+                  </a:txBody>
+                  <a:tcPr/>
+                </a:tc>
+              </a:tr>
+              <a:tr h="604066">
+                <a:tc>
+                  <a:txBody>
+                    <a:bodyPr/>
+                    <a:lstStyle/>
+                    <a:p>
+                      <a:r>
+                        <a:rPr lang="en-US" dirty="0" err="1" smtClean="0"/>
+                        <a:t>x,y</a:t>
+                      </a:r>
+                      <a:r>
+                        <a:rPr lang="en-US" baseline="0" dirty="0" smtClean="0"/>
+                        <a:t> </a:t>
+                      </a:r>
+                      <a:endParaRPr lang="en-US" dirty="0"/>
+                    </a:p>
+                  </a:txBody>
+                  <a:tcPr/>
+                </a:tc>
+                <a:tc>
+                  <a:txBody>
+                    <a:bodyPr/>
+                    <a:lstStyle/>
+                    <a:p>
+                      <a:r>
+                        <a:rPr lang="en-US" dirty="0" smtClean="0"/>
+                        <a:t>List(eg.5,10)</a:t>
+                      </a:r>
+                      <a:r>
+                        <a:rPr lang="en-US" baseline="0" dirty="0" smtClean="0"/>
+                        <a:t> run on 5</a:t>
+                      </a:r>
+                      <a:r>
+                        <a:rPr lang="en-US" baseline="30000" dirty="0" smtClean="0"/>
+                        <a:t>th</a:t>
+                      </a:r>
+                      <a:r>
+                        <a:rPr lang="en-US" baseline="0" dirty="0" smtClean="0"/>
+                        <a:t> minute and 10</a:t>
+                      </a:r>
+                      <a:r>
+                        <a:rPr lang="en-US" baseline="30000" dirty="0" smtClean="0"/>
+                        <a:t>th</a:t>
+                      </a:r>
+                      <a:r>
+                        <a:rPr lang="en-US" baseline="0" dirty="0" smtClean="0"/>
+                        <a:t> minute</a:t>
+                      </a:r>
+                      <a:endParaRPr lang="en-US" dirty="0"/>
+                    </a:p>
+                  </a:txBody>
+                  <a:tcPr/>
+                </a:tc>
+              </a:tr>
+              <a:tr h="583491">
+                <a:tc>
+                  <a:txBody>
+                    <a:bodyPr/>
+                    <a:lstStyle/>
+                    <a:p>
+                      <a:r>
+                        <a:rPr lang="en-US" dirty="0" smtClean="0"/>
+                        <a:t>*/</a:t>
+                      </a:r>
+                      <a:endParaRPr lang="en-US" dirty="0"/>
+                    </a:p>
+                  </a:txBody>
+                  <a:tcPr/>
+                </a:tc>
+                <a:tc>
+                  <a:txBody>
+                    <a:bodyPr/>
+                    <a:lstStyle/>
+                    <a:p>
+                      <a:r>
+                        <a:rPr lang="en-US" dirty="0" smtClean="0"/>
+                        <a:t>*/7,</a:t>
+                      </a:r>
+                      <a:r>
+                        <a:rPr lang="en-US" baseline="0" dirty="0" smtClean="0"/>
+                        <a:t> run the job every 7 minutes.</a:t>
+                      </a:r>
+                      <a:endParaRPr lang="en-US" dirty="0"/>
+                    </a:p>
+                  </a:txBody>
+                  <a:tcPr/>
+                </a:tc>
+              </a:tr>
+              <a:tr h="833558">
+                <a:tc>
+                  <a:txBody>
+                    <a:bodyPr/>
+                    <a:lstStyle/>
+                    <a:p>
+                      <a:r>
+                        <a:rPr lang="en-US" dirty="0" smtClean="0"/>
+                        <a:t>Ja, Feb … Tue, Wed</a:t>
+                      </a:r>
+                      <a:endParaRPr lang="en-US" dirty="0"/>
+                    </a:p>
+                  </a:txBody>
+                  <a:tcPr/>
+                </a:tc>
+                <a:tc>
+                  <a:txBody>
+                    <a:bodyPr/>
+                    <a:lstStyle/>
+                    <a:p>
+                      <a:r>
+                        <a:rPr lang="en-US" dirty="0" smtClean="0"/>
+                        <a:t>English abbreviations for months</a:t>
+                      </a:r>
+                      <a:r>
+                        <a:rPr lang="en-US" baseline="0" dirty="0" smtClean="0"/>
+                        <a:t> and weekdays.</a:t>
+                      </a:r>
+                      <a:endParaRPr lang="en-US" dirty="0"/>
+                    </a:p>
+                  </a:txBody>
+                  <a:tcPr/>
+                </a:tc>
+              </a:tr>
+            </a:tbl>
+          </a:graphicData>
+        </a:graphic>
+      </p:graphicFrame>
+    </p:spTree>
+    <p:extLst>
+      <p:ext uri="{BB962C8B-B14F-4D97-AF65-F5344CB8AC3E}">
+        <p14:creationId xmlns:p14="http://schemas.microsoft.com/office/powerpoint/2010/main" val="2469066818"/>
       </p:ext>
     </p:extLst>
   </p:cSld>

</xml_diff>

<commit_message>
Adding SystemD and the Boot Procedure
</commit_message>
<xml_diff>
--- a/9.SoftwareManagementAndCron/09-SoftwareManagementAndCron.pptx
+++ b/9.SoftwareManagementAndCron/09-SoftwareManagementAndCron.pptx
@@ -3923,15 +3923,37 @@
                   <a:schemeClr val="accent6"/>
                 </a:solidFill>
               </a:rPr>
-              <a:t>The default utility used to manage software packages on Red Hat Enterprise Linux </a:t>
-            </a:r>
-            <a:r>
+              <a:t>The default utility used to manage software packages on Red Hat Enterprise Linux distributions is ‘yum’.  Yum is designed to work with repositories, which are online depots of available software packages.</a:t>
+            </a:r>
+            <a:br>
               <a:rPr lang="en-US" sz="3100" dirty="0" smtClean="0">
                 <a:solidFill>
                   <a:schemeClr val="accent6"/>
                 </a:solidFill>
               </a:rPr>
-              <a:t>distributions </a:t>
+            </a:br>
+            <a:r>
+              <a:rPr lang="en-US" sz="3100" dirty="0">
+                <a:solidFill>
+                  <a:schemeClr val="accent6"/>
+                </a:solidFill>
+              </a:rPr>
+              <a:t/>
+            </a:r>
+            <a:br>
+              <a:rPr lang="en-US" sz="3100" dirty="0">
+                <a:solidFill>
+                  <a:schemeClr val="accent6"/>
+                </a:solidFill>
+              </a:rPr>
+            </a:br>
+            <a:r>
+              <a:rPr lang="en-US" sz="3100" dirty="0">
+                <a:solidFill>
+                  <a:srgbClr val="FFFF00"/>
+                </a:solidFill>
+              </a:rPr>
+              <a:t>https://fedoraproject.org/wiki/EPEL</a:t>
             </a:r>
             <a:r>
               <a:rPr lang="en-US" sz="3100" dirty="0" smtClean="0">
@@ -3939,7 +3961,7 @@
                   <a:schemeClr val="accent6"/>
                 </a:solidFill>
               </a:rPr>
-              <a:t>is ‘yum’.  Yum is designed to work with repositories, which are online depots of available software packages.</a:t>
+              <a:t/>
             </a:r>
             <a:br>
               <a:rPr lang="en-US" sz="3100" dirty="0" smtClean="0">
@@ -3964,74 +3986,28 @@
               </a:rPr>
             </a:br>
             <a:r>
-              <a:rPr lang="en-US" sz="3100" dirty="0">
-                <a:solidFill>
-                  <a:srgbClr val="FFFF00"/>
-                </a:solidFill>
-              </a:rPr>
-              <a:t>https://fedoraproject.org/wiki/EPEL</a:t>
-            </a:r>
-            <a:r>
               <a:rPr lang="en-US" sz="3100" dirty="0" smtClean="0">
                 <a:solidFill>
                   <a:schemeClr val="accent6"/>
                 </a:solidFill>
               </a:rPr>
-              <a:t/>
-            </a:r>
-            <a:br>
+              <a:t>Software on Red Hat Enterprise </a:t>
+            </a:r>
+            <a:r>
+              <a:rPr lang="en-US" sz="3100" dirty="0" err="1" smtClean="0">
+                <a:solidFill>
+                  <a:schemeClr val="accent6"/>
+                </a:solidFill>
+              </a:rPr>
+              <a:t>Linuxes</a:t>
+            </a:r>
+            <a:r>
               <a:rPr lang="en-US" sz="3100" dirty="0" smtClean="0">
                 <a:solidFill>
                   <a:schemeClr val="accent6"/>
                 </a:solidFill>
               </a:rPr>
-            </a:br>
-            <a:r>
-              <a:rPr lang="en-US" sz="3100" dirty="0">
-                <a:solidFill>
-                  <a:schemeClr val="accent6"/>
-                </a:solidFill>
-              </a:rPr>
-              <a:t/>
-            </a:r>
-            <a:br>
-              <a:rPr lang="en-US" sz="3100" dirty="0">
-                <a:solidFill>
-                  <a:schemeClr val="accent6"/>
-                </a:solidFill>
-              </a:rPr>
-            </a:br>
-            <a:r>
-              <a:rPr lang="en-US" sz="3100" dirty="0" smtClean="0">
-                <a:solidFill>
-                  <a:schemeClr val="accent6"/>
-                </a:solidFill>
-              </a:rPr>
-              <a:t>Software on Red Hat Enterprise </a:t>
-            </a:r>
-            <a:r>
-              <a:rPr lang="en-US" sz="3100" dirty="0" err="1" smtClean="0">
-                <a:solidFill>
-                  <a:schemeClr val="accent6"/>
-                </a:solidFill>
-              </a:rPr>
-              <a:t>Linuxes</a:t>
-            </a:r>
-            <a:r>
-              <a:rPr lang="en-US" sz="3100" dirty="0" smtClean="0">
-                <a:solidFill>
-                  <a:schemeClr val="accent6"/>
-                </a:solidFill>
-              </a:rPr>
-              <a:t> </a:t>
-            </a:r>
-            <a:r>
-              <a:rPr lang="en-US" sz="3100" dirty="0" smtClean="0">
-                <a:solidFill>
-                  <a:schemeClr val="accent6"/>
-                </a:solidFill>
-              </a:rPr>
-              <a:t>is provided in the RPM format(Red Hat Package Manager). This is a specific format used to archive the package and provide package metadata as well. </a:t>
+              <a:t> is provided in the RPM format(Red Hat Package Manager). This is a specific format used to archive the package and provide package metadata as well. </a:t>
             </a:r>
             <a:r>
               <a:rPr lang="en-US" sz="3100" dirty="0">
@@ -5083,39 +5059,7 @@
                   <a:schemeClr val="accent6"/>
                 </a:solidFill>
               </a:rPr>
-              <a:t>Modern processors can run in two modes: 32-bit mode, and 64-bit mode. In 32-bit mode, they can access up to 4GB memory, in 64-bit mode, they can access much more. Older processors only support 32-bit mode. </a:t>
-            </a:r>
-            <a:r>
-              <a:rPr lang="en-US" sz="1400" dirty="0" smtClean="0">
-                <a:solidFill>
-                  <a:schemeClr val="accent6"/>
-                </a:solidFill>
-              </a:rPr>
-              <a:t>Applications(packages</a:t>
-            </a:r>
-            <a:r>
-              <a:rPr lang="en-US" sz="1400" dirty="0" smtClean="0">
-                <a:solidFill>
-                  <a:schemeClr val="accent6"/>
-                </a:solidFill>
-              </a:rPr>
-              <a:t>) can also be written or compiled for 32-bit </a:t>
-            </a:r>
-            <a:r>
-              <a:rPr lang="en-US" sz="1400" dirty="0" smtClean="0">
-                <a:solidFill>
-                  <a:schemeClr val="accent6"/>
-                </a:solidFill>
-              </a:rPr>
-              <a:t>or </a:t>
-            </a:r>
-            <a:r>
-              <a:rPr lang="en-US" sz="1400" dirty="0" smtClean="0">
-                <a:solidFill>
-                  <a:schemeClr val="accent6"/>
-                </a:solidFill>
-              </a:rPr>
-              <a:t>64-bit mode.</a:t>
+              <a:t>Modern processors can run in two modes: 32-bit mode, and 64-bit mode. In 32-bit mode, they can access up to 4GB memory, in 64-bit mode, they can access much more. Older processors only support 32-bit mode. Applications(packages) can also be written or compiled for 32-bit or 64-bit mode.</a:t>
             </a:r>
           </a:p>
           <a:p>
@@ -5480,23 +5424,7 @@
                   <a:schemeClr val="accent6"/>
                 </a:solidFill>
               </a:rPr>
-              <a:t>The yum takes care of resolving these dependencies automatically! In Red Hat Enterprise Linux repositories are provided through Red Hat Network. After registering with RHN, you can install software packages that are verified by Red Hat automatically. </a:t>
-            </a:r>
-            <a:r>
-              <a:rPr lang="en-US" sz="2200" dirty="0" smtClean="0">
-                <a:solidFill>
-                  <a:schemeClr val="accent6"/>
-                </a:solidFill>
-              </a:rPr>
-              <a:t>If </a:t>
-            </a:r>
-            <a:r>
-              <a:rPr lang="en-US" sz="2200" dirty="0" smtClean="0">
-                <a:solidFill>
-                  <a:schemeClr val="accent6"/>
-                </a:solidFill>
-              </a:rPr>
-              <a:t>you choose to install Red Hat Enterprise Linux without a registration key, it cannot get in touch with the RHN repositories, and you end up with no repositories at all</a:t>
+              <a:t>The yum takes care of resolving these dependencies automatically! In Red Hat Enterprise Linux repositories are provided through Red Hat Network. After registering with RHN, you can install software packages that are verified by Red Hat automatically. If you choose to install Red Hat Enterprise Linux without a registration key, it cannot get in touch with the RHN repositories, and you end up with no repositories at all</a:t>
             </a:r>
             <a:r>
               <a:rPr lang="en-US" sz="2200" dirty="0">
@@ -7008,23 +6936,7 @@
                   <a:schemeClr val="accent6"/>
                 </a:solidFill>
               </a:rPr>
-              <a:t>Locat</a:t>
-            </a:r>
-            <a:r>
-              <a:rPr lang="en-US" sz="2000" dirty="0" smtClean="0">
-                <a:solidFill>
-                  <a:schemeClr val="accent6"/>
-                </a:solidFill>
-              </a:rPr>
-              <a:t>ing </a:t>
-            </a:r>
-            <a:r>
-              <a:rPr lang="en-US" sz="2000" dirty="0" smtClean="0">
-                <a:solidFill>
-                  <a:schemeClr val="accent6"/>
-                </a:solidFill>
-              </a:rPr>
-              <a:t>repositories involves a risk, you want to make sure that you can trust the software packages you are trying to install. This is why repositories in general use keys for package signing. GPG key makes it possible to check whether packages have been changed since the owner of the repository provided them. </a:t>
+              <a:t>Locating repositories involves a risk, you want to make sure that you can trust the software packages you are trying to install. This is why repositories in general use keys for package signing. GPG key makes it possible to check whether packages have been changed since the owner of the repository provided them. </a:t>
             </a:r>
             <a:br>
               <a:rPr lang="en-US" sz="2000" dirty="0" smtClean="0">
@@ -7301,15 +7213,7 @@
                   <a:schemeClr val="accent6"/>
                 </a:solidFill>
               </a:rPr>
-              <a:t>4. yum </a:t>
-            </a:r>
-            <a:r>
-              <a:rPr lang="en-US" sz="2000" dirty="0" smtClean="0">
-                <a:solidFill>
-                  <a:schemeClr val="accent6"/>
-                </a:solidFill>
-              </a:rPr>
-              <a:t>history</a:t>
+              <a:t>4. yum history</a:t>
             </a:r>
             <a:br>
               <a:rPr lang="en-US" sz="2000" dirty="0" smtClean="0">
@@ -7659,53 +7563,61 @@
                   <a:schemeClr val="accent6"/>
                 </a:solidFill>
               </a:rPr>
-              <a:t>Creating </a:t>
-            </a:r>
-            <a:r>
+              <a:t>Creating your own repository.</a:t>
+            </a:r>
+            <a:br>
               <a:rPr lang="en-US" sz="1800" dirty="0" smtClean="0">
                 <a:solidFill>
                   <a:schemeClr val="accent6"/>
                 </a:solidFill>
               </a:rPr>
-              <a:t>your own repository.</a:t>
-            </a:r>
-            <a:br>
+            </a:br>
+            <a:r>
               <a:rPr lang="en-US" sz="1800" dirty="0" smtClean="0">
                 <a:solidFill>
-                  <a:schemeClr val="accent6"/>
-                </a:solidFill>
-              </a:rPr>
-            </a:br>
+                  <a:srgbClr val="FF0000"/>
+                </a:solidFill>
+              </a:rPr>
+              <a:t>Exercises</a:t>
+            </a:r>
             <a:r>
               <a:rPr lang="en-US" sz="1800" dirty="0" smtClean="0">
                 <a:solidFill>
-                  <a:srgbClr val="FF0000"/>
-                </a:solidFill>
-              </a:rPr>
-              <a:t>Exercises</a:t>
-            </a:r>
-            <a:r>
+                  <a:schemeClr val="accent6"/>
+                </a:solidFill>
+              </a:rPr>
+              <a:t>:</a:t>
+            </a:r>
+            <a:br>
               <a:rPr lang="en-US" sz="1800" dirty="0" smtClean="0">
                 <a:solidFill>
                   <a:schemeClr val="accent6"/>
                 </a:solidFill>
               </a:rPr>
-              <a:t>:</a:t>
-            </a:r>
-            <a:br>
+            </a:br>
+            <a:r>
               <a:rPr lang="en-US" sz="1800" dirty="0" smtClean="0">
                 <a:solidFill>
                   <a:schemeClr val="accent6"/>
                 </a:solidFill>
               </a:rPr>
-            </a:br>
+              <a:t>1. yum </a:t>
+            </a:r>
+            <a:r>
+              <a:rPr lang="en-US" sz="1800" dirty="0" err="1" smtClean="0">
+                <a:solidFill>
+                  <a:schemeClr val="accent6"/>
+                </a:solidFill>
+              </a:rPr>
+              <a:t>repolist</a:t>
+            </a:r>
             <a:r>
               <a:rPr lang="en-US" sz="1800" dirty="0" smtClean="0">
                 <a:solidFill>
                   <a:schemeClr val="accent6"/>
                 </a:solidFill>
               </a:rPr>
-              <a:t>1. yum </a:t>
+              <a:t> all; grep –r enabled /</a:t>
             </a:r>
             <a:r>
               <a:rPr lang="en-US" sz="1800" dirty="0" err="1" smtClean="0">
@@ -7713,7 +7625,7 @@
                   <a:schemeClr val="accent6"/>
                 </a:solidFill>
               </a:rPr>
-              <a:t>repolist</a:t>
+              <a:t>etc</a:t>
             </a:r>
             <a:r>
               <a:rPr lang="en-US" sz="1800" dirty="0" smtClean="0">
@@ -7721,7 +7633,15 @@
                   <a:schemeClr val="accent6"/>
                 </a:solidFill>
               </a:rPr>
-              <a:t> </a:t>
+              <a:t>/</a:t>
+            </a:r>
+            <a:r>
+              <a:rPr lang="en-US" sz="1800" dirty="0" err="1" smtClean="0">
+                <a:solidFill>
+                  <a:schemeClr val="accent6"/>
+                </a:solidFill>
+              </a:rPr>
+              <a:t>yum.repos.d</a:t>
             </a:r>
             <a:r>
               <a:rPr lang="en-US" sz="1800" dirty="0" smtClean="0">
@@ -7729,7 +7649,22 @@
                   <a:schemeClr val="accent6"/>
                 </a:solidFill>
               </a:rPr>
-              <a:t>all; grep –r enabled /</a:t>
+              <a:t>/</a:t>
+            </a:r>
+            <a:br>
+              <a:rPr lang="en-US" sz="1800" dirty="0" smtClean="0">
+                <a:solidFill>
+                  <a:schemeClr val="accent6"/>
+                </a:solidFill>
+              </a:rPr>
+            </a:br>
+            <a:r>
+              <a:rPr lang="en-US" sz="1800" dirty="0" smtClean="0">
+                <a:solidFill>
+                  <a:schemeClr val="accent6"/>
+                </a:solidFill>
+              </a:rPr>
+              <a:t>2. Enable and disable repositories with ‘yum-</a:t>
             </a:r>
             <a:r>
               <a:rPr lang="en-US" sz="1800" dirty="0" err="1" smtClean="0">
@@ -7737,7 +7672,7 @@
                   <a:schemeClr val="accent6"/>
                 </a:solidFill>
               </a:rPr>
-              <a:t>etc</a:t>
+              <a:t>config</a:t>
             </a:r>
             <a:r>
               <a:rPr lang="en-US" sz="1800" dirty="0" smtClean="0">
@@ -7745,156 +7680,85 @@
                   <a:schemeClr val="accent6"/>
                 </a:solidFill>
               </a:rPr>
-              <a:t>/</a:t>
-            </a:r>
-            <a:r>
-              <a:rPr lang="en-US" sz="1800" dirty="0" err="1" smtClean="0">
-                <a:solidFill>
-                  <a:schemeClr val="accent6"/>
-                </a:solidFill>
-              </a:rPr>
-              <a:t>yum.repos.d</a:t>
-            </a:r>
-            <a:r>
+              <a:t>-manager’.</a:t>
+            </a:r>
+            <a:br>
               <a:rPr lang="en-US" sz="1800" dirty="0" smtClean="0">
                 <a:solidFill>
                   <a:schemeClr val="accent6"/>
                 </a:solidFill>
               </a:rPr>
-              <a:t>/</a:t>
-            </a:r>
+            </a:br>
             <a:r>
               <a:rPr lang="en-US" sz="1800" dirty="0" smtClean="0">
                 <a:solidFill>
                   <a:schemeClr val="accent6"/>
                 </a:solidFill>
               </a:rPr>
-              <a:t/>
-            </a:r>
-            <a:br>
+              <a:t>3. </a:t>
+            </a:r>
+            <a:r>
+              <a:rPr lang="en-US" sz="1800" dirty="0">
+                <a:solidFill>
+                  <a:schemeClr val="accent6"/>
+                </a:solidFill>
+              </a:rPr>
+              <a:t>yum-</a:t>
+            </a:r>
+            <a:r>
+              <a:rPr lang="en-US" sz="1800" dirty="0" err="1">
+                <a:solidFill>
+                  <a:schemeClr val="accent6"/>
+                </a:solidFill>
+              </a:rPr>
+              <a:t>config</a:t>
+            </a:r>
+            <a:r>
+              <a:rPr lang="en-US" sz="1800" dirty="0">
+                <a:solidFill>
+                  <a:schemeClr val="accent6"/>
+                </a:solidFill>
+              </a:rPr>
+              <a:t>-manager --add-repo="https://dl.fedoraproject.org/pub/</a:t>
+            </a:r>
+            <a:r>
+              <a:rPr lang="en-US" sz="1800" dirty="0" err="1">
+                <a:solidFill>
+                  <a:schemeClr val="accent6"/>
+                </a:solidFill>
+              </a:rPr>
+              <a:t>epel</a:t>
+            </a:r>
+            <a:r>
+              <a:rPr lang="en-US" sz="1800" dirty="0">
+                <a:solidFill>
+                  <a:schemeClr val="accent6"/>
+                </a:solidFill>
+              </a:rPr>
+              <a:t>/7/x86_64</a:t>
+            </a:r>
+            <a:r>
               <a:rPr lang="en-US" sz="1800" dirty="0" smtClean="0">
                 <a:solidFill>
                   <a:schemeClr val="accent6"/>
                 </a:solidFill>
               </a:rPr>
-            </a:br>
-            <a:r>
+              <a:t>/"</a:t>
+            </a:r>
+            <a:br>
               <a:rPr lang="en-US" sz="1800" dirty="0" smtClean="0">
                 <a:solidFill>
                   <a:schemeClr val="accent6"/>
                 </a:solidFill>
               </a:rPr>
-              <a:t>2. Enable and disable repositories with ‘yum-</a:t>
-            </a:r>
-            <a:r>
-              <a:rPr lang="en-US" sz="1800" dirty="0" err="1" smtClean="0">
-                <a:solidFill>
-                  <a:schemeClr val="accent6"/>
-                </a:solidFill>
-              </a:rPr>
-              <a:t>config</a:t>
-            </a:r>
+            </a:br>
             <a:r>
               <a:rPr lang="en-US" sz="1800" dirty="0" smtClean="0">
                 <a:solidFill>
                   <a:schemeClr val="accent6"/>
                 </a:solidFill>
               </a:rPr>
-              <a:t>-manager’.</a:t>
-            </a:r>
-            <a:br>
-              <a:rPr lang="en-US" sz="1800" dirty="0" smtClean="0">
-                <a:solidFill>
-                  <a:schemeClr val="accent6"/>
-                </a:solidFill>
-              </a:rPr>
-            </a:br>
-            <a:r>
-              <a:rPr lang="en-US" sz="1800" dirty="0" smtClean="0">
-                <a:solidFill>
-                  <a:schemeClr val="accent6"/>
-                </a:solidFill>
-              </a:rPr>
-              <a:t>3. </a:t>
-            </a:r>
-            <a:r>
-              <a:rPr lang="en-US" sz="1800" dirty="0">
-                <a:solidFill>
-                  <a:schemeClr val="accent6"/>
-                </a:solidFill>
-              </a:rPr>
-              <a:t>yum-</a:t>
-            </a:r>
-            <a:r>
-              <a:rPr lang="en-US" sz="1800" dirty="0" err="1">
-                <a:solidFill>
-                  <a:schemeClr val="accent6"/>
-                </a:solidFill>
-              </a:rPr>
-              <a:t>config</a:t>
-            </a:r>
-            <a:r>
-              <a:rPr lang="en-US" sz="1800" dirty="0">
-                <a:solidFill>
-                  <a:schemeClr val="accent6"/>
-                </a:solidFill>
-              </a:rPr>
-              <a:t>-manager --add-repo="https://dl.fedoraproject.org/pub/</a:t>
-            </a:r>
-            <a:r>
-              <a:rPr lang="en-US" sz="1800" dirty="0" err="1">
-                <a:solidFill>
-                  <a:schemeClr val="accent6"/>
-                </a:solidFill>
-              </a:rPr>
-              <a:t>epel</a:t>
-            </a:r>
-            <a:r>
-              <a:rPr lang="en-US" sz="1800" dirty="0">
-                <a:solidFill>
-                  <a:schemeClr val="accent6"/>
-                </a:solidFill>
-              </a:rPr>
-              <a:t>/7/x86_64</a:t>
-            </a:r>
-            <a:r>
-              <a:rPr lang="en-US" sz="1800" dirty="0" smtClean="0">
-                <a:solidFill>
-                  <a:schemeClr val="accent6"/>
-                </a:solidFill>
-              </a:rPr>
-              <a:t>/"</a:t>
-            </a:r>
-            <a:r>
-              <a:rPr lang="en-US" sz="1800" dirty="0" smtClean="0">
-                <a:solidFill>
-                  <a:schemeClr val="accent6"/>
-                </a:solidFill>
-              </a:rPr>
-              <a:t/>
-            </a:r>
-            <a:br>
-              <a:rPr lang="en-US" sz="1800" dirty="0" smtClean="0">
-                <a:solidFill>
-                  <a:schemeClr val="accent6"/>
-                </a:solidFill>
-              </a:rPr>
-            </a:br>
-            <a:r>
-              <a:rPr lang="en-US" sz="1800" dirty="0" smtClean="0">
-                <a:solidFill>
-                  <a:schemeClr val="accent6"/>
-                </a:solidFill>
-              </a:rPr>
-              <a:t>4.  </a:t>
-            </a:r>
-            <a:r>
-              <a:rPr lang="en-US" sz="1800" dirty="0" smtClean="0">
-                <a:solidFill>
-                  <a:schemeClr val="accent6"/>
-                </a:solidFill>
-              </a:rPr>
-              <a:t>yum </a:t>
+              <a:t>4.  yum </a:t>
             </a:r>
             <a:r>
               <a:rPr lang="en-US" sz="1800" dirty="0" err="1" smtClean="0">

</xml_diff>